<commit_message>
NLP pipeline tweaks and documentation update
</commit_message>
<xml_diff>
--- a/documentation/Presentation.pptx
+++ b/documentation/Presentation.pptx
@@ -5,7 +5,7 @@
     <p:sldMasterId id="2147483648" r:id="rId1"/>
   </p:sldMasterIdLst>
   <p:notesMasterIdLst>
-    <p:notesMasterId r:id="rId10"/>
+    <p:notesMasterId r:id="rId11"/>
   </p:notesMasterIdLst>
   <p:sldIdLst>
     <p:sldId id="271" r:id="rId2"/>
@@ -14,8 +14,9 @@
     <p:sldId id="334" r:id="rId5"/>
     <p:sldId id="335" r:id="rId6"/>
     <p:sldId id="336" r:id="rId7"/>
-    <p:sldId id="338" r:id="rId8"/>
-    <p:sldId id="333" r:id="rId9"/>
+    <p:sldId id="340" r:id="rId8"/>
+    <p:sldId id="338" r:id="rId9"/>
+    <p:sldId id="333" r:id="rId10"/>
   </p:sldIdLst>
   <p:sldSz cx="9144000" cy="6858000" type="screen4x3"/>
   <p:notesSz cx="6858000" cy="9144000"/>
@@ -1052,7 +1053,7 @@
           </a:ln>
           <a:extLst>
             <a:ext uri="{C572A759-6A51-4108-AA02-DFA0A04FC94B}">
-              <ma14:wrappingTextBoxFlag xmlns:ma14="http://schemas.microsoft.com/office/mac/drawingml/2011/main" xmlns:a14="http://schemas.microsoft.com/office/drawing/2010/main" xmlns:m="http://schemas.openxmlformats.org/officeDocument/2006/math" xmlns="" val="1"/>
+              <ma14:wrappingTextBoxFlag xmlns="" xmlns:m="http://schemas.openxmlformats.org/officeDocument/2006/math" xmlns:a14="http://schemas.microsoft.com/office/drawing/2010/main" xmlns:ma14="http://schemas.microsoft.com/office/mac/drawingml/2011/main" val="1"/>
             </a:ext>
           </a:extLst>
         </p:spPr>
@@ -4573,7 +4574,7 @@
           </a:ln>
           <a:extLst>
             <a:ext uri="{C572A759-6A51-4108-AA02-DFA0A04FC94B}">
-              <ma14:wrappingTextBoxFlag xmlns:ma14="http://schemas.microsoft.com/office/mac/drawingml/2011/main" xmlns:a14="http://schemas.microsoft.com/office/drawing/2010/main" xmlns:m="http://schemas.openxmlformats.org/officeDocument/2006/math" xmlns="" val="1"/>
+              <ma14:wrappingTextBoxFlag xmlns="" xmlns:m="http://schemas.openxmlformats.org/officeDocument/2006/math" xmlns:a14="http://schemas.microsoft.com/office/drawing/2010/main" xmlns:ma14="http://schemas.microsoft.com/office/mac/drawingml/2011/main" val="1"/>
             </a:ext>
           </a:extLst>
         </p:spPr>
@@ -4612,7 +4613,7 @@
           </a:ln>
           <a:extLst>
             <a:ext uri="{C572A759-6A51-4108-AA02-DFA0A04FC94B}">
-              <ma14:wrappingTextBoxFlag xmlns:ma14="http://schemas.microsoft.com/office/mac/drawingml/2011/main" xmlns:a14="http://schemas.microsoft.com/office/drawing/2010/main" xmlns:m="http://schemas.openxmlformats.org/officeDocument/2006/math" xmlns="" val="1"/>
+              <ma14:wrappingTextBoxFlag xmlns="" xmlns:m="http://schemas.openxmlformats.org/officeDocument/2006/math" xmlns:a14="http://schemas.microsoft.com/office/drawing/2010/main" xmlns:ma14="http://schemas.microsoft.com/office/mac/drawingml/2011/main" val="1"/>
             </a:ext>
           </a:extLst>
         </p:spPr>
@@ -5622,7 +5623,7 @@
           </a:ln>
           <a:extLst>
             <a:ext uri="{C572A759-6A51-4108-AA02-DFA0A04FC94B}">
-              <ma14:wrappingTextBoxFlag xmlns="" xmlns:m="http://schemas.openxmlformats.org/officeDocument/2006/math" xmlns:a14="http://schemas.microsoft.com/office/drawing/2010/main" xmlns:ma14="http://schemas.microsoft.com/office/mac/drawingml/2011/main" val="1"/>
+              <ma14:wrappingTextBoxFlag xmlns:ma14="http://schemas.microsoft.com/office/mac/drawingml/2011/main" xmlns:a14="http://schemas.microsoft.com/office/drawing/2010/main" xmlns:m="http://schemas.openxmlformats.org/officeDocument/2006/math" xmlns="" val="1"/>
             </a:ext>
           </a:extLst>
         </p:spPr>
@@ -5683,7 +5684,7 @@
           </a:ln>
           <a:extLst>
             <a:ext uri="{C572A759-6A51-4108-AA02-DFA0A04FC94B}">
-              <ma14:wrappingTextBoxFlag xmlns="" xmlns:m="http://schemas.openxmlformats.org/officeDocument/2006/math" xmlns:a14="http://schemas.microsoft.com/office/drawing/2010/main" xmlns:ma14="http://schemas.microsoft.com/office/mac/drawingml/2011/main" val="1"/>
+              <ma14:wrappingTextBoxFlag xmlns:ma14="http://schemas.microsoft.com/office/mac/drawingml/2011/main" xmlns:a14="http://schemas.microsoft.com/office/drawing/2010/main" xmlns:m="http://schemas.openxmlformats.org/officeDocument/2006/math" xmlns="" val="1"/>
             </a:ext>
           </a:extLst>
         </p:spPr>
@@ -5734,7 +5735,7 @@
           </a:ln>
           <a:extLst>
             <a:ext uri="{C572A759-6A51-4108-AA02-DFA0A04FC94B}">
-              <ma14:wrappingTextBoxFlag xmlns="" xmlns:m="http://schemas.openxmlformats.org/officeDocument/2006/math" xmlns:a14="http://schemas.microsoft.com/office/drawing/2010/main" xmlns:ma14="http://schemas.microsoft.com/office/mac/drawingml/2011/main" val="1"/>
+              <ma14:wrappingTextBoxFlag xmlns:ma14="http://schemas.microsoft.com/office/mac/drawingml/2011/main" xmlns:a14="http://schemas.microsoft.com/office/drawing/2010/main" xmlns:m="http://schemas.openxmlformats.org/officeDocument/2006/math" xmlns="" val="1"/>
             </a:ext>
           </a:extLst>
         </p:spPr>
@@ -6072,7 +6073,7 @@
           </a:ln>
           <a:extLst>
             <a:ext uri="{C572A759-6A51-4108-AA02-DFA0A04FC94B}">
-              <ma14:wrappingTextBoxFlag xmlns:ma14="http://schemas.microsoft.com/office/mac/drawingml/2011/main" xmlns:a14="http://schemas.microsoft.com/office/drawing/2010/main" xmlns:m="http://schemas.openxmlformats.org/officeDocument/2006/math" xmlns="" val="1"/>
+              <ma14:wrappingTextBoxFlag xmlns="" xmlns:m="http://schemas.openxmlformats.org/officeDocument/2006/math" xmlns:a14="http://schemas.microsoft.com/office/drawing/2010/main" xmlns:ma14="http://schemas.microsoft.com/office/mac/drawingml/2011/main" val="1"/>
             </a:ext>
           </a:extLst>
         </p:spPr>
@@ -6133,7 +6134,7 @@
           </a:ln>
           <a:extLst>
             <a:ext uri="{C572A759-6A51-4108-AA02-DFA0A04FC94B}">
-              <ma14:wrappingTextBoxFlag xmlns:ma14="http://schemas.microsoft.com/office/mac/drawingml/2011/main" xmlns:a14="http://schemas.microsoft.com/office/drawing/2010/main" xmlns:m="http://schemas.openxmlformats.org/officeDocument/2006/math" xmlns="" val="1"/>
+              <ma14:wrappingTextBoxFlag xmlns="" xmlns:m="http://schemas.openxmlformats.org/officeDocument/2006/math" xmlns:a14="http://schemas.microsoft.com/office/drawing/2010/main" xmlns:ma14="http://schemas.microsoft.com/office/mac/drawingml/2011/main" val="1"/>
             </a:ext>
           </a:extLst>
         </p:spPr>
@@ -6184,7 +6185,7 @@
           </a:ln>
           <a:extLst>
             <a:ext uri="{C572A759-6A51-4108-AA02-DFA0A04FC94B}">
-              <ma14:wrappingTextBoxFlag xmlns:ma14="http://schemas.microsoft.com/office/mac/drawingml/2011/main" xmlns:a14="http://schemas.microsoft.com/office/drawing/2010/main" xmlns:m="http://schemas.openxmlformats.org/officeDocument/2006/math" xmlns="" val="1"/>
+              <ma14:wrappingTextBoxFlag xmlns="" xmlns:m="http://schemas.openxmlformats.org/officeDocument/2006/math" xmlns:a14="http://schemas.microsoft.com/office/drawing/2010/main" xmlns:ma14="http://schemas.microsoft.com/office/mac/drawingml/2011/main" val="1"/>
             </a:ext>
           </a:extLst>
         </p:spPr>
@@ -6690,7 +6691,7 @@
           </a:ln>
           <a:extLst>
             <a:ext uri="{C572A759-6A51-4108-AA02-DFA0A04FC94B}">
-              <ma14:wrappingTextBoxFlag xmlns="" xmlns:m="http://schemas.openxmlformats.org/officeDocument/2006/math" xmlns:a14="http://schemas.microsoft.com/office/drawing/2010/main" xmlns:ma14="http://schemas.microsoft.com/office/mac/drawingml/2011/main" val="1"/>
+              <ma14:wrappingTextBoxFlag xmlns:ma14="http://schemas.microsoft.com/office/mac/drawingml/2011/main" xmlns:a14="http://schemas.microsoft.com/office/drawing/2010/main" xmlns:m="http://schemas.openxmlformats.org/officeDocument/2006/math" xmlns="" val="1"/>
             </a:ext>
           </a:extLst>
         </p:spPr>
@@ -6745,7 +6746,7 @@
           </a:ln>
           <a:extLst>
             <a:ext uri="{C572A759-6A51-4108-AA02-DFA0A04FC94B}">
-              <ma14:wrappingTextBoxFlag xmlns="" xmlns:m="http://schemas.openxmlformats.org/officeDocument/2006/math" xmlns:a14="http://schemas.microsoft.com/office/drawing/2010/main" xmlns:ma14="http://schemas.microsoft.com/office/mac/drawingml/2011/main" val="1"/>
+              <ma14:wrappingTextBoxFlag xmlns:ma14="http://schemas.microsoft.com/office/mac/drawingml/2011/main" xmlns:a14="http://schemas.microsoft.com/office/drawing/2010/main" xmlns:m="http://schemas.openxmlformats.org/officeDocument/2006/math" xmlns="" val="1"/>
             </a:ext>
           </a:extLst>
         </p:spPr>
@@ -6796,7 +6797,7 @@
           </a:ln>
           <a:extLst>
             <a:ext uri="{C572A759-6A51-4108-AA02-DFA0A04FC94B}">
-              <ma14:wrappingTextBoxFlag xmlns="" xmlns:m="http://schemas.openxmlformats.org/officeDocument/2006/math" xmlns:a14="http://schemas.microsoft.com/office/drawing/2010/main" xmlns:ma14="http://schemas.microsoft.com/office/mac/drawingml/2011/main" val="1"/>
+              <ma14:wrappingTextBoxFlag xmlns:ma14="http://schemas.microsoft.com/office/mac/drawingml/2011/main" xmlns:a14="http://schemas.microsoft.com/office/drawing/2010/main" xmlns:m="http://schemas.openxmlformats.org/officeDocument/2006/math" xmlns="" val="1"/>
             </a:ext>
           </a:extLst>
         </p:spPr>
@@ -7204,7 +7205,7 @@
           </a:ln>
           <a:extLst>
             <a:ext uri="{C572A759-6A51-4108-AA02-DFA0A04FC94B}">
-              <ma14:wrappingTextBoxFlag xmlns:ma14="http://schemas.microsoft.com/office/mac/drawingml/2011/main" xmlns:a14="http://schemas.microsoft.com/office/drawing/2010/main" xmlns:m="http://schemas.openxmlformats.org/officeDocument/2006/math" xmlns="" val="1"/>
+              <ma14:wrappingTextBoxFlag xmlns="" xmlns:m="http://schemas.openxmlformats.org/officeDocument/2006/math" xmlns:a14="http://schemas.microsoft.com/office/drawing/2010/main" xmlns:ma14="http://schemas.microsoft.com/office/mac/drawingml/2011/main" val="1"/>
             </a:ext>
           </a:extLst>
         </p:spPr>
@@ -7609,7 +7610,7 @@
           </a:ln>
           <a:extLst>
             <a:ext uri="{C572A759-6A51-4108-AA02-DFA0A04FC94B}">
-              <ma14:wrappingTextBoxFlag xmlns="" xmlns:m="http://schemas.openxmlformats.org/officeDocument/2006/math" xmlns:a14="http://schemas.microsoft.com/office/drawing/2010/main" xmlns:ma14="http://schemas.microsoft.com/office/mac/drawingml/2011/main" val="1"/>
+              <ma14:wrappingTextBoxFlag xmlns:ma14="http://schemas.microsoft.com/office/mac/drawingml/2011/main" xmlns:a14="http://schemas.microsoft.com/office/drawing/2010/main" xmlns:m="http://schemas.openxmlformats.org/officeDocument/2006/math" xmlns="" val="1"/>
             </a:ext>
           </a:extLst>
         </p:spPr>
@@ -7965,6 +7966,408 @@
       </p:grpSpPr>
       <p:sp>
         <p:nvSpPr>
+          <p:cNvPr id="18" name="Textfeld 11">
+            <a:extLst>
+              <a:ext uri="{FF2B5EF4-FFF2-40B4-BE49-F238E27FC236}">
+                <a16:creationId xmlns:a16="http://schemas.microsoft.com/office/drawing/2014/main" id="{06C6545E-FB3B-AE3B-9D25-602E2D9EF1BA}"/>
+              </a:ext>
+            </a:extLst>
+          </p:cNvPr>
+          <p:cNvSpPr txBox="1"/>
+          <p:nvPr/>
+        </p:nvSpPr>
+        <p:spPr>
+          <a:xfrm>
+            <a:off x="503795" y="1047837"/>
+            <a:ext cx="7813648" cy="369332"/>
+          </a:xfrm>
+          <a:prstGeom prst="rect">
+            <a:avLst/>
+          </a:prstGeom>
+          <a:ln w="12700">
+            <a:miter lim="400000"/>
+          </a:ln>
+          <a:extLst>
+            <a:ext uri="{C572A759-6A51-4108-AA02-DFA0A04FC94B}">
+              <ma14:wrappingTextBoxFlag xmlns="" xmlns:m="http://schemas.openxmlformats.org/officeDocument/2006/math" xmlns:a14="http://schemas.microsoft.com/office/drawing/2010/main" xmlns:ma14="http://schemas.microsoft.com/office/mac/drawingml/2011/main" val="1"/>
+            </a:ext>
+          </a:extLst>
+        </p:spPr>
+        <p:txBody>
+          <a:bodyPr wrap="square" lIns="0" tIns="0" rIns="0" bIns="0">
+            <a:spAutoFit/>
+          </a:bodyPr>
+          <a:lstStyle>
+            <a:lvl1pPr>
+              <a:defRPr sz="3200" b="1">
+                <a:solidFill>
+                  <a:schemeClr val="accent1"/>
+                </a:solidFill>
+              </a:defRPr>
+            </a:lvl1pPr>
+          </a:lstStyle>
+          <a:p>
+            <a:r>
+              <a:rPr lang="en-US" sz="2400" b="0" dirty="0"/>
+              <a:t>Pipeline demo run</a:t>
+            </a:r>
+          </a:p>
+        </p:txBody>
+      </p:sp>
+      <p:sp>
+        <p:nvSpPr>
+          <p:cNvPr id="19" name="Begrüßung durch die Zentrale Studienberatung…">
+            <a:extLst>
+              <a:ext uri="{FF2B5EF4-FFF2-40B4-BE49-F238E27FC236}">
+                <a16:creationId xmlns:a16="http://schemas.microsoft.com/office/drawing/2014/main" id="{8D2EA736-DA6B-25DA-9FE6-F78FCA6C5088}"/>
+              </a:ext>
+            </a:extLst>
+          </p:cNvPr>
+          <p:cNvSpPr txBox="1">
+            <a:spLocks noGrp="1"/>
+          </p:cNvSpPr>
+          <p:nvPr>
+            <p:ph type="body" idx="1"/>
+          </p:nvPr>
+        </p:nvSpPr>
+        <p:spPr>
+          <a:xfrm>
+            <a:off x="536574" y="1628799"/>
+            <a:ext cx="8139880" cy="4822802"/>
+          </a:xfrm>
+          <a:prstGeom prst="rect">
+            <a:avLst/>
+          </a:prstGeom>
+        </p:spPr>
+        <p:txBody>
+          <a:bodyPr>
+            <a:normAutofit/>
+          </a:bodyPr>
+          <a:lstStyle/>
+          <a:p>
+            <a:pPr algn="just" defTabSz="521208">
+              <a:spcBef>
+                <a:spcPts val="200"/>
+              </a:spcBef>
+              <a:defRPr sz="1254">
+                <a:solidFill>
+                  <a:schemeClr val="accent1"/>
+                </a:solidFill>
+              </a:defRPr>
+            </a:pPr>
+            <a:endParaRPr lang="en-US" sz="1600" dirty="0">
+              <a:solidFill>
+                <a:schemeClr val="tx1"/>
+              </a:solidFill>
+              <a:latin typeface="Calibri Light" panose="020F0302020204030204" pitchFamily="34" charset="0"/>
+              <a:cs typeface="Calibri Light" panose="020F0302020204030204" pitchFamily="34" charset="0"/>
+            </a:endParaRPr>
+          </a:p>
+          <a:p>
+            <a:pPr algn="just" defTabSz="521208">
+              <a:spcBef>
+                <a:spcPts val="200"/>
+              </a:spcBef>
+              <a:defRPr sz="1254">
+                <a:solidFill>
+                  <a:schemeClr val="accent1"/>
+                </a:solidFill>
+              </a:defRPr>
+            </a:pPr>
+            <a:r>
+              <a:rPr lang="en-US" sz="1600" dirty="0">
+                <a:solidFill>
+                  <a:schemeClr val="tx1"/>
+                </a:solidFill>
+                <a:latin typeface="Calibri Light" panose="020F0302020204030204" pitchFamily="34" charset="0"/>
+                <a:cs typeface="Calibri Light" panose="020F0302020204030204" pitchFamily="34" charset="0"/>
+              </a:rPr>
+              <a:t>“At Bosch, diversity is a fundamental pillar. We ensured a diverse workforce by taking necessary measures in the past. Still, The company intends to increase workforce diversity by 40%. It would enable a healthy and balanced workforce that would be warm and welcoming for people from diverse backgrounds.”</a:t>
+            </a:r>
+          </a:p>
+          <a:p>
+            <a:pPr defTabSz="521208">
+              <a:spcBef>
+                <a:spcPts val="200"/>
+              </a:spcBef>
+              <a:defRPr sz="1254">
+                <a:solidFill>
+                  <a:schemeClr val="accent1"/>
+                </a:solidFill>
+              </a:defRPr>
+            </a:pPr>
+            <a:endParaRPr lang="en-US" sz="1600" dirty="0">
+              <a:solidFill>
+                <a:schemeClr val="tx1"/>
+              </a:solidFill>
+              <a:latin typeface="Calibri Light" panose="020F0302020204030204" pitchFamily="34" charset="0"/>
+              <a:cs typeface="Calibri Light" panose="020F0302020204030204" pitchFamily="34" charset="0"/>
+            </a:endParaRPr>
+          </a:p>
+          <a:p>
+            <a:pPr algn="ctr" defTabSz="521208">
+              <a:spcBef>
+                <a:spcPts val="200"/>
+              </a:spcBef>
+              <a:defRPr sz="1254">
+                <a:solidFill>
+                  <a:schemeClr val="accent1"/>
+                </a:solidFill>
+              </a:defRPr>
+            </a:pPr>
+            <a:endParaRPr lang="en-US" sz="1600" dirty="0">
+              <a:solidFill>
+                <a:schemeClr val="tx1"/>
+              </a:solidFill>
+              <a:latin typeface="Calibri Light" panose="020F0302020204030204" pitchFamily="34" charset="0"/>
+              <a:cs typeface="Calibri Light" panose="020F0302020204030204" pitchFamily="34" charset="0"/>
+            </a:endParaRPr>
+          </a:p>
+          <a:p>
+            <a:pPr algn="ctr" defTabSz="521208">
+              <a:spcBef>
+                <a:spcPts val="200"/>
+              </a:spcBef>
+              <a:defRPr sz="1254">
+                <a:solidFill>
+                  <a:schemeClr val="accent1"/>
+                </a:solidFill>
+              </a:defRPr>
+            </a:pPr>
+            <a:endParaRPr lang="en-US" sz="1600" dirty="0">
+              <a:solidFill>
+                <a:schemeClr val="tx1"/>
+              </a:solidFill>
+              <a:latin typeface="Calibri Light" panose="020F0302020204030204" pitchFamily="34" charset="0"/>
+              <a:cs typeface="Calibri Light" panose="020F0302020204030204" pitchFamily="34" charset="0"/>
+            </a:endParaRPr>
+          </a:p>
+          <a:p>
+            <a:pPr algn="ctr" defTabSz="521208">
+              <a:spcBef>
+                <a:spcPts val="200"/>
+              </a:spcBef>
+              <a:defRPr sz="1254">
+                <a:solidFill>
+                  <a:schemeClr val="accent1"/>
+                </a:solidFill>
+              </a:defRPr>
+            </a:pPr>
+            <a:endParaRPr lang="en-US" sz="1600" dirty="0">
+              <a:solidFill>
+                <a:schemeClr val="tx1"/>
+              </a:solidFill>
+              <a:latin typeface="Calibri Light" panose="020F0302020204030204" pitchFamily="34" charset="0"/>
+              <a:cs typeface="Calibri Light" panose="020F0302020204030204" pitchFamily="34" charset="0"/>
+            </a:endParaRPr>
+          </a:p>
+          <a:p>
+            <a:pPr algn="ctr" defTabSz="521208">
+              <a:spcBef>
+                <a:spcPts val="200"/>
+              </a:spcBef>
+              <a:defRPr sz="1254">
+                <a:solidFill>
+                  <a:schemeClr val="accent1"/>
+                </a:solidFill>
+              </a:defRPr>
+            </a:pPr>
+            <a:endParaRPr lang="en-US" sz="1600" dirty="0">
+              <a:solidFill>
+                <a:schemeClr val="tx1"/>
+              </a:solidFill>
+              <a:latin typeface="Calibri Light" panose="020F0302020204030204" pitchFamily="34" charset="0"/>
+              <a:cs typeface="Calibri Light" panose="020F0302020204030204" pitchFamily="34" charset="0"/>
+            </a:endParaRPr>
+          </a:p>
+          <a:p>
+            <a:pPr algn="ctr" defTabSz="521208">
+              <a:spcBef>
+                <a:spcPts val="200"/>
+              </a:spcBef>
+              <a:defRPr sz="1254">
+                <a:solidFill>
+                  <a:schemeClr val="accent1"/>
+                </a:solidFill>
+              </a:defRPr>
+            </a:pPr>
+            <a:endParaRPr lang="en-US" sz="1600" dirty="0">
+              <a:solidFill>
+                <a:schemeClr val="tx1"/>
+              </a:solidFill>
+              <a:latin typeface="Calibri Light" panose="020F0302020204030204" pitchFamily="34" charset="0"/>
+              <a:cs typeface="Calibri Light" panose="020F0302020204030204" pitchFamily="34" charset="0"/>
+            </a:endParaRPr>
+          </a:p>
+          <a:p>
+            <a:pPr algn="ctr" defTabSz="521208">
+              <a:spcBef>
+                <a:spcPts val="200"/>
+              </a:spcBef>
+              <a:defRPr sz="1254">
+                <a:solidFill>
+                  <a:schemeClr val="accent1"/>
+                </a:solidFill>
+              </a:defRPr>
+            </a:pPr>
+            <a:endParaRPr lang="en-US" sz="1600" dirty="0">
+              <a:solidFill>
+                <a:schemeClr val="tx1"/>
+              </a:solidFill>
+              <a:latin typeface="Calibri Light" panose="020F0302020204030204" pitchFamily="34" charset="0"/>
+              <a:cs typeface="Calibri Light" panose="020F0302020204030204" pitchFamily="34" charset="0"/>
+            </a:endParaRPr>
+          </a:p>
+          <a:p>
+            <a:pPr algn="ctr" defTabSz="521208">
+              <a:spcBef>
+                <a:spcPts val="200"/>
+              </a:spcBef>
+              <a:defRPr sz="1254">
+                <a:solidFill>
+                  <a:schemeClr val="accent1"/>
+                </a:solidFill>
+              </a:defRPr>
+            </a:pPr>
+            <a:r>
+              <a:rPr lang="en-US" sz="1600" dirty="0">
+                <a:solidFill>
+                  <a:schemeClr val="tx1"/>
+                </a:solidFill>
+                <a:latin typeface="Calibri Light" panose="020F0302020204030204" pitchFamily="34" charset="0"/>
+                <a:cs typeface="Calibri Light" panose="020F0302020204030204" pitchFamily="34" charset="0"/>
+              </a:rPr>
+              <a:t>“Still, Bosch intends to increase workforce diversity by 40 %.”</a:t>
+            </a:r>
+          </a:p>
+        </p:txBody>
+      </p:sp>
+      <p:sp>
+        <p:nvSpPr>
+          <p:cNvPr id="2" name="Down Arrow 1">
+            <a:extLst>
+              <a:ext uri="{FF2B5EF4-FFF2-40B4-BE49-F238E27FC236}">
+                <a16:creationId xmlns:a16="http://schemas.microsoft.com/office/drawing/2014/main" id="{2F872628-F1A1-37AA-F9F4-B3A76D40B723}"/>
+              </a:ext>
+            </a:extLst>
+          </p:cNvPr>
+          <p:cNvSpPr/>
+          <p:nvPr/>
+        </p:nvSpPr>
+        <p:spPr>
+          <a:xfrm>
+            <a:off x="4050579" y="3429000"/>
+            <a:ext cx="720080" cy="792088"/>
+          </a:xfrm>
+          <a:prstGeom prst="downArrow">
+            <a:avLst/>
+          </a:prstGeom>
+          <a:solidFill>
+            <a:schemeClr val="accent2">
+              <a:lumMod val="90000"/>
+            </a:schemeClr>
+          </a:solidFill>
+          <a:ln w="25400" cap="flat">
+            <a:solidFill>
+              <a:schemeClr val="accent1"/>
+            </a:solidFill>
+            <a:prstDash val="solid"/>
+            <a:round/>
+          </a:ln>
+          <a:effectLst/>
+          <a:sp3d/>
+        </p:spPr>
+        <p:style>
+          <a:lnRef idx="0">
+            <a:scrgbClr r="0" g="0" b="0"/>
+          </a:lnRef>
+          <a:fillRef idx="0">
+            <a:scrgbClr r="0" g="0" b="0"/>
+          </a:fillRef>
+          <a:effectRef idx="0">
+            <a:scrgbClr r="0" g="0" b="0"/>
+          </a:effectRef>
+          <a:fontRef idx="none"/>
+        </p:style>
+        <p:txBody>
+          <a:bodyPr rot="0" spcFirstLastPara="1" vertOverflow="overflow" horzOverflow="overflow" vert="horz" wrap="square" lIns="45719" tIns="45719" rIns="45719" bIns="45719" numCol="1" spcCol="38100" rtlCol="0" anchor="ctr">
+            <a:spAutoFit/>
+          </a:bodyPr>
+          <a:lstStyle/>
+          <a:p>
+            <a:pPr marL="0" marR="0" indent="0" algn="l" defTabSz="914400" rtl="0" fontAlgn="auto" latinLnBrk="0" hangingPunct="0">
+              <a:lnSpc>
+                <a:spcPct val="100000"/>
+              </a:lnSpc>
+              <a:spcBef>
+                <a:spcPts val="0"/>
+              </a:spcBef>
+              <a:spcAft>
+                <a:spcPts val="0"/>
+              </a:spcAft>
+              <a:buClrTx/>
+              <a:buSzTx/>
+              <a:buFontTx/>
+              <a:buNone/>
+              <a:tabLst/>
+            </a:pPr>
+            <a:endParaRPr kumimoji="0" lang="en-US" sz="1800" b="0" i="0" u="none" strike="noStrike" cap="none" spc="0" normalizeH="0" baseline="0">
+              <a:ln>
+                <a:noFill/>
+              </a:ln>
+              <a:solidFill>
+                <a:srgbClr val="000000"/>
+              </a:solidFill>
+              <a:effectLst/>
+              <a:uFillTx/>
+              <a:latin typeface="+mj-lt"/>
+              <a:ea typeface="+mj-ea"/>
+              <a:cs typeface="+mj-cs"/>
+              <a:sym typeface="Calibri"/>
+            </a:endParaRPr>
+          </a:p>
+        </p:txBody>
+      </p:sp>
+    </p:spTree>
+    <p:extLst>
+      <p:ext uri="{BB962C8B-B14F-4D97-AF65-F5344CB8AC3E}">
+        <p14:creationId xmlns:p14="http://schemas.microsoft.com/office/powerpoint/2010/main" val="2444895803"/>
+      </p:ext>
+    </p:extLst>
+  </p:cSld>
+  <p:clrMapOvr>
+    <a:masterClrMapping/>
+  </p:clrMapOvr>
+  <mc:AlternateContent xmlns:mc="http://schemas.openxmlformats.org/markup-compatibility/2006">
+    <mc:Choice xmlns:p14="http://schemas.microsoft.com/office/powerpoint/2010/main" Requires="p14">
+      <p:transition p14:dur="0"/>
+    </mc:Choice>
+    <mc:Fallback>
+      <p:transition/>
+    </mc:Fallback>
+  </mc:AlternateContent>
+</p:sld>
+</file>
+
+<file path=ppt/slides/slide8.xml><?xml version="1.0" encoding="utf-8"?>
+<p:sld xmlns:a="http://schemas.openxmlformats.org/drawingml/2006/main" xmlns:r="http://schemas.openxmlformats.org/officeDocument/2006/relationships" xmlns:p="http://schemas.openxmlformats.org/presentationml/2006/main">
+  <p:cSld>
+    <p:spTree>
+      <p:nvGrpSpPr>
+        <p:cNvPr id="1" name=""/>
+        <p:cNvGrpSpPr/>
+        <p:nvPr/>
+      </p:nvGrpSpPr>
+      <p:grpSpPr>
+        <a:xfrm>
+          <a:off x="0" y="0"/>
+          <a:ext cx="0" cy="0"/>
+          <a:chOff x="0" y="0"/>
+          <a:chExt cx="0" cy="0"/>
+        </a:xfrm>
+      </p:grpSpPr>
+      <p:sp>
+        <p:nvSpPr>
           <p:cNvPr id="15" name="Textfeld 13">
             <a:extLst>
               <a:ext uri="{FF2B5EF4-FFF2-40B4-BE49-F238E27FC236}">
@@ -7988,7 +8391,7 @@
           </a:ln>
           <a:extLst>
             <a:ext uri="{C572A759-6A51-4108-AA02-DFA0A04FC94B}">
-              <ma14:wrappingTextBoxFlag xmlns:ma14="http://schemas.microsoft.com/office/mac/drawingml/2011/main" xmlns:a14="http://schemas.microsoft.com/office/drawing/2010/main" xmlns:m="http://schemas.openxmlformats.org/officeDocument/2006/math" xmlns="" val="1"/>
+              <ma14:wrappingTextBoxFlag xmlns="" xmlns:m="http://schemas.openxmlformats.org/officeDocument/2006/math" xmlns:a14="http://schemas.microsoft.com/office/drawing/2010/main" xmlns:ma14="http://schemas.microsoft.com/office/mac/drawingml/2011/main" val="1"/>
             </a:ext>
           </a:extLst>
         </p:spPr>
@@ -8043,7 +8446,7 @@
           </a:ln>
           <a:extLst>
             <a:ext uri="{C572A759-6A51-4108-AA02-DFA0A04FC94B}">
-              <ma14:wrappingTextBoxFlag xmlns:ma14="http://schemas.microsoft.com/office/mac/drawingml/2011/main" xmlns:a14="http://schemas.microsoft.com/office/drawing/2010/main" xmlns:m="http://schemas.openxmlformats.org/officeDocument/2006/math" xmlns="" val="1"/>
+              <ma14:wrappingTextBoxFlag xmlns="" xmlns:m="http://schemas.openxmlformats.org/officeDocument/2006/math" xmlns:a14="http://schemas.microsoft.com/office/drawing/2010/main" xmlns:ma14="http://schemas.microsoft.com/office/mac/drawingml/2011/main" val="1"/>
             </a:ext>
           </a:extLst>
         </p:spPr>
@@ -8094,7 +8497,7 @@
           </a:ln>
           <a:extLst>
             <a:ext uri="{C572A759-6A51-4108-AA02-DFA0A04FC94B}">
-              <ma14:wrappingTextBoxFlag xmlns:ma14="http://schemas.microsoft.com/office/mac/drawingml/2011/main" xmlns:a14="http://schemas.microsoft.com/office/drawing/2010/main" xmlns:m="http://schemas.openxmlformats.org/officeDocument/2006/math" xmlns="" val="1"/>
+              <ma14:wrappingTextBoxFlag xmlns="" xmlns:m="http://schemas.openxmlformats.org/officeDocument/2006/math" xmlns:a14="http://schemas.microsoft.com/office/drawing/2010/main" xmlns:ma14="http://schemas.microsoft.com/office/mac/drawingml/2011/main" val="1"/>
             </a:ext>
           </a:extLst>
         </p:spPr>
@@ -9430,7 +9833,7 @@
 </p:sld>
 </file>
 
-<file path=ppt/slides/slide8.xml><?xml version="1.0" encoding="utf-8"?>
+<file path=ppt/slides/slide9.xml><?xml version="1.0" encoding="utf-8"?>
 <p:sld xmlns:a="http://schemas.openxmlformats.org/drawingml/2006/main" xmlns:r="http://schemas.openxmlformats.org/officeDocument/2006/relationships" xmlns:p="http://schemas.openxmlformats.org/presentationml/2006/main">
   <p:cSld>
     <p:spTree>
@@ -9511,7 +9914,7 @@
           </a:ln>
           <a:extLst>
             <a:ext uri="{C572A759-6A51-4108-AA02-DFA0A04FC94B}">
-              <ma14:wrappingTextBoxFlag xmlns:ma14="http://schemas.microsoft.com/office/mac/drawingml/2011/main" xmlns:a14="http://schemas.microsoft.com/office/drawing/2010/main" xmlns:m="http://schemas.openxmlformats.org/officeDocument/2006/math" xmlns="" val="1"/>
+              <ma14:wrappingTextBoxFlag xmlns="" xmlns:m="http://schemas.openxmlformats.org/officeDocument/2006/math" xmlns:a14="http://schemas.microsoft.com/office/drawing/2010/main" xmlns:ma14="http://schemas.microsoft.com/office/mac/drawingml/2011/main" val="1"/>
             </a:ext>
           </a:extLst>
         </p:spPr>

</xml_diff>

<commit_message>
updated documentation and fine-tune inference process
</commit_message>
<xml_diff>
--- a/documentation/Presentation.pptx
+++ b/documentation/Presentation.pptx
@@ -1054,7 +1054,7 @@
           </a:ln>
           <a:extLst>
             <a:ext uri="{C572A759-6A51-4108-AA02-DFA0A04FC94B}">
-              <ma14:wrappingTextBoxFlag xmlns:ma14="http://schemas.microsoft.com/office/mac/drawingml/2011/main" xmlns:a14="http://schemas.microsoft.com/office/drawing/2010/main" xmlns:m="http://schemas.openxmlformats.org/officeDocument/2006/math" xmlns="" val="1"/>
+              <ma14:wrappingTextBoxFlag xmlns="" xmlns:m="http://schemas.openxmlformats.org/officeDocument/2006/math" xmlns:a14="http://schemas.microsoft.com/office/drawing/2010/main" xmlns:ma14="http://schemas.microsoft.com/office/mac/drawingml/2011/main" val="1"/>
             </a:ext>
           </a:extLst>
         </p:spPr>
@@ -4575,7 +4575,7 @@
           </a:ln>
           <a:extLst>
             <a:ext uri="{C572A759-6A51-4108-AA02-DFA0A04FC94B}">
-              <ma14:wrappingTextBoxFlag xmlns:ma14="http://schemas.microsoft.com/office/mac/drawingml/2011/main" xmlns:a14="http://schemas.microsoft.com/office/drawing/2010/main" xmlns:m="http://schemas.openxmlformats.org/officeDocument/2006/math" xmlns="" val="1"/>
+              <ma14:wrappingTextBoxFlag xmlns="" xmlns:m="http://schemas.openxmlformats.org/officeDocument/2006/math" xmlns:a14="http://schemas.microsoft.com/office/drawing/2010/main" xmlns:ma14="http://schemas.microsoft.com/office/mac/drawingml/2011/main" val="1"/>
             </a:ext>
           </a:extLst>
         </p:spPr>
@@ -4614,7 +4614,7 @@
           </a:ln>
           <a:extLst>
             <a:ext uri="{C572A759-6A51-4108-AA02-DFA0A04FC94B}">
-              <ma14:wrappingTextBoxFlag xmlns:ma14="http://schemas.microsoft.com/office/mac/drawingml/2011/main" xmlns:a14="http://schemas.microsoft.com/office/drawing/2010/main" xmlns:m="http://schemas.openxmlformats.org/officeDocument/2006/math" xmlns="" val="1"/>
+              <ma14:wrappingTextBoxFlag xmlns="" xmlns:m="http://schemas.openxmlformats.org/officeDocument/2006/math" xmlns:a14="http://schemas.microsoft.com/office/drawing/2010/main" xmlns:ma14="http://schemas.microsoft.com/office/mac/drawingml/2011/main" val="1"/>
             </a:ext>
           </a:extLst>
         </p:spPr>
@@ -5538,8 +5538,8 @@
         </p:nvSpPr>
         <p:spPr>
           <a:xfrm>
-            <a:off x="7085410" y="6093296"/>
-            <a:ext cx="1765227" cy="307777"/>
+            <a:off x="7006863" y="6093296"/>
+            <a:ext cx="1843774" cy="307777"/>
           </a:xfrm>
           <a:prstGeom prst="rect">
             <a:avLst/>
@@ -5553,18 +5553,25 @@
           <a:p>
             <a:pPr algn="r"/>
             <a:r>
-              <a:rPr lang="en-GB" sz="1400" dirty="0">
+              <a:rPr lang="en-US" sz="1400" dirty="0">
                 <a:latin typeface="Arial" pitchFamily="34" charset="0"/>
                 <a:cs typeface="Arial" pitchFamily="34" charset="0"/>
               </a:rPr>
-              <a:t>January</a:t>
+              <a:t>February 16</a:t>
+            </a:r>
+            <a:r>
+              <a:rPr lang="de-DE" sz="1400" dirty="0" err="1">
+                <a:latin typeface="Arial" pitchFamily="34" charset="0"/>
+                <a:cs typeface="Arial" pitchFamily="34" charset="0"/>
+              </a:rPr>
+              <a:t>th</a:t>
             </a:r>
             <a:r>
               <a:rPr lang="de-DE" sz="1400" dirty="0">
                 <a:latin typeface="Arial" pitchFamily="34" charset="0"/>
                 <a:cs typeface="Arial" pitchFamily="34" charset="0"/>
               </a:rPr>
-              <a:t> 23th, 2023 </a:t>
+              <a:t>, 2023 </a:t>
             </a:r>
           </a:p>
         </p:txBody>
@@ -5663,7 +5670,7 @@
           </a:ln>
           <a:extLst>
             <a:ext uri="{C572A759-6A51-4108-AA02-DFA0A04FC94B}">
-              <ma14:wrappingTextBoxFlag xmlns:ma14="http://schemas.microsoft.com/office/mac/drawingml/2011/main" xmlns:a14="http://schemas.microsoft.com/office/drawing/2010/main" xmlns:m="http://schemas.openxmlformats.org/officeDocument/2006/math" xmlns="" val="1"/>
+              <ma14:wrappingTextBoxFlag xmlns="" xmlns:m="http://schemas.openxmlformats.org/officeDocument/2006/math" xmlns:a14="http://schemas.microsoft.com/office/drawing/2010/main" xmlns:ma14="http://schemas.microsoft.com/office/mac/drawingml/2011/main" val="1"/>
             </a:ext>
           </a:extLst>
         </p:spPr>
@@ -5953,118 +5960,6 @@
       </p:grpSpPr>
       <p:sp>
         <p:nvSpPr>
-          <p:cNvPr id="15" name="Textfeld 13">
-            <a:extLst>
-              <a:ext uri="{FF2B5EF4-FFF2-40B4-BE49-F238E27FC236}">
-                <a16:creationId xmlns:a16="http://schemas.microsoft.com/office/drawing/2014/main" id="{53532D9D-2A71-C118-CDDA-077EC64473C2}"/>
-              </a:ext>
-            </a:extLst>
-          </p:cNvPr>
-          <p:cNvSpPr txBox="1"/>
-          <p:nvPr/>
-        </p:nvSpPr>
-        <p:spPr>
-          <a:xfrm>
-            <a:off x="6775436" y="6174502"/>
-            <a:ext cx="1835213" cy="127001"/>
-          </a:xfrm>
-          <a:prstGeom prst="rect">
-            <a:avLst/>
-          </a:prstGeom>
-          <a:ln w="12700">
-            <a:miter lim="400000"/>
-          </a:ln>
-          <a:extLst>
-            <a:ext uri="{C572A759-6A51-4108-AA02-DFA0A04FC94B}">
-              <ma14:wrappingTextBoxFlag xmlns="" xmlns:m="http://schemas.openxmlformats.org/officeDocument/2006/math" xmlns:a14="http://schemas.microsoft.com/office/drawing/2010/main" xmlns:ma14="http://schemas.microsoft.com/office/mac/drawingml/2011/main" val="1"/>
-            </a:ext>
-          </a:extLst>
-        </p:spPr>
-        <p:txBody>
-          <a:bodyPr wrap="square" lIns="0" tIns="0" rIns="0" bIns="0">
-            <a:spAutoFit/>
-          </a:bodyPr>
-          <a:lstStyle>
-            <a:lvl1pPr algn="r">
-              <a:defRPr sz="800">
-                <a:solidFill>
-                  <a:schemeClr val="accent3">
-                    <a:lumOff val="44000"/>
-                  </a:schemeClr>
-                </a:solidFill>
-                <a:latin typeface="Arial"/>
-                <a:ea typeface="Arial"/>
-                <a:cs typeface="Arial"/>
-                <a:sym typeface="Arial"/>
-              </a:defRPr>
-            </a:lvl1pPr>
-          </a:lstStyle>
-          <a:p>
-            <a:r>
-              <a:rPr dirty="0"/>
-              <a:t>© </a:t>
-            </a:r>
-            <a:r>
-              <a:rPr dirty="0" err="1"/>
-              <a:t>urlaubsguru.de</a:t>
-            </a:r>
-            <a:endParaRPr dirty="0"/>
-          </a:p>
-        </p:txBody>
-      </p:sp>
-      <p:sp>
-        <p:nvSpPr>
-          <p:cNvPr id="16" name="Textfeld 8">
-            <a:extLst>
-              <a:ext uri="{FF2B5EF4-FFF2-40B4-BE49-F238E27FC236}">
-                <a16:creationId xmlns:a16="http://schemas.microsoft.com/office/drawing/2014/main" id="{70D19317-1B4F-304C-1D4A-EA0302FFCF7D}"/>
-              </a:ext>
-            </a:extLst>
-          </p:cNvPr>
-          <p:cNvSpPr txBox="1"/>
-          <p:nvPr/>
-        </p:nvSpPr>
-        <p:spPr>
-          <a:xfrm>
-            <a:off x="4224923" y="5404556"/>
-            <a:ext cx="4385727" cy="492443"/>
-          </a:xfrm>
-          <a:prstGeom prst="rect">
-            <a:avLst/>
-          </a:prstGeom>
-          <a:ln w="12700">
-            <a:miter lim="400000"/>
-          </a:ln>
-          <a:extLst>
-            <a:ext uri="{C572A759-6A51-4108-AA02-DFA0A04FC94B}">
-              <ma14:wrappingTextBoxFlag xmlns="" xmlns:m="http://schemas.openxmlformats.org/officeDocument/2006/math" xmlns:a14="http://schemas.microsoft.com/office/drawing/2010/main" xmlns:ma14="http://schemas.microsoft.com/office/mac/drawingml/2011/main" val="1"/>
-            </a:ext>
-          </a:extLst>
-        </p:spPr>
-        <p:txBody>
-          <a:bodyPr wrap="square" lIns="0" tIns="0" rIns="0" bIns="0">
-            <a:spAutoFit/>
-          </a:bodyPr>
-          <a:lstStyle>
-            <a:lvl1pPr algn="ctr">
-              <a:defRPr sz="3200" b="1">
-                <a:solidFill>
-                  <a:schemeClr val="accent3">
-                    <a:lumOff val="44000"/>
-                  </a:schemeClr>
-                </a:solidFill>
-              </a:defRPr>
-            </a:lvl1pPr>
-          </a:lstStyle>
-          <a:p>
-            <a:r>
-              <a:t>Wir unterstützen Sie!</a:t>
-            </a:r>
-          </a:p>
-        </p:txBody>
-      </p:sp>
-      <p:sp>
-        <p:nvSpPr>
           <p:cNvPr id="18" name="Textfeld 11">
             <a:extLst>
               <a:ext uri="{FF2B5EF4-FFF2-40B4-BE49-F238E27FC236}">
@@ -6088,7 +5983,7 @@
           </a:ln>
           <a:extLst>
             <a:ext uri="{C572A759-6A51-4108-AA02-DFA0A04FC94B}">
-              <ma14:wrappingTextBoxFlag xmlns="" xmlns:m="http://schemas.openxmlformats.org/officeDocument/2006/math" xmlns:a14="http://schemas.microsoft.com/office/drawing/2010/main" xmlns:ma14="http://schemas.microsoft.com/office/mac/drawingml/2011/main" val="1"/>
+              <ma14:wrappingTextBoxFlag xmlns:ma14="http://schemas.microsoft.com/office/mac/drawingml/2011/main" xmlns:a14="http://schemas.microsoft.com/office/drawing/2010/main" xmlns:m="http://schemas.openxmlformats.org/officeDocument/2006/math" xmlns="" val="1"/>
             </a:ext>
           </a:extLst>
         </p:spPr>
@@ -6428,7 +6323,7 @@
           </a:ln>
           <a:extLst>
             <a:ext uri="{C572A759-6A51-4108-AA02-DFA0A04FC94B}">
-              <ma14:wrappingTextBoxFlag xmlns:ma14="http://schemas.microsoft.com/office/mac/drawingml/2011/main" xmlns:a14="http://schemas.microsoft.com/office/drawing/2010/main" xmlns:m="http://schemas.openxmlformats.org/officeDocument/2006/math" xmlns="" val="1"/>
+              <ma14:wrappingTextBoxFlag xmlns="" xmlns:m="http://schemas.openxmlformats.org/officeDocument/2006/math" xmlns:a14="http://schemas.microsoft.com/office/drawing/2010/main" xmlns:ma14="http://schemas.microsoft.com/office/mac/drawingml/2011/main" val="1"/>
             </a:ext>
           </a:extLst>
         </p:spPr>
@@ -6489,7 +6384,7 @@
           </a:ln>
           <a:extLst>
             <a:ext uri="{C572A759-6A51-4108-AA02-DFA0A04FC94B}">
-              <ma14:wrappingTextBoxFlag xmlns:ma14="http://schemas.microsoft.com/office/mac/drawingml/2011/main" xmlns:a14="http://schemas.microsoft.com/office/drawing/2010/main" xmlns:m="http://schemas.openxmlformats.org/officeDocument/2006/math" xmlns="" val="1"/>
+              <ma14:wrappingTextBoxFlag xmlns="" xmlns:m="http://schemas.openxmlformats.org/officeDocument/2006/math" xmlns:a14="http://schemas.microsoft.com/office/drawing/2010/main" xmlns:ma14="http://schemas.microsoft.com/office/mac/drawingml/2011/main" val="1"/>
             </a:ext>
           </a:extLst>
         </p:spPr>
@@ -6540,7 +6435,7 @@
           </a:ln>
           <a:extLst>
             <a:ext uri="{C572A759-6A51-4108-AA02-DFA0A04FC94B}">
-              <ma14:wrappingTextBoxFlag xmlns:ma14="http://schemas.microsoft.com/office/mac/drawingml/2011/main" xmlns:a14="http://schemas.microsoft.com/office/drawing/2010/main" xmlns:m="http://schemas.openxmlformats.org/officeDocument/2006/math" xmlns="" val="1"/>
+              <ma14:wrappingTextBoxFlag xmlns="" xmlns:m="http://schemas.openxmlformats.org/officeDocument/2006/math" xmlns:a14="http://schemas.microsoft.com/office/drawing/2010/main" xmlns:ma14="http://schemas.microsoft.com/office/mac/drawingml/2011/main" val="1"/>
             </a:ext>
           </a:extLst>
         </p:spPr>
@@ -6638,10 +6533,11 @@
             </a:r>
           </a:p>
           <a:p>
-            <a:pPr algn="just" defTabSz="521208">
+            <a:pPr marL="0" lvl="1" indent="0" algn="just" defTabSz="521208">
               <a:spcBef>
                 <a:spcPts val="200"/>
               </a:spcBef>
+              <a:buNone/>
               <a:defRPr sz="1254">
                 <a:solidFill>
                   <a:schemeClr val="accent1"/>
@@ -6657,10 +6553,11 @@
             </a:endParaRPr>
           </a:p>
           <a:p>
-            <a:pPr algn="just" defTabSz="521208">
+            <a:pPr marL="0" lvl="1" indent="0" algn="just" defTabSz="521208">
               <a:spcBef>
                 <a:spcPts val="200"/>
               </a:spcBef>
+              <a:buNone/>
               <a:defRPr sz="1254">
                 <a:solidFill>
                   <a:schemeClr val="accent1"/>
@@ -6675,7 +6572,27 @@
                 <a:latin typeface="Calibri Light" panose="020F0302020204030204" pitchFamily="34" charset="0"/>
                 <a:cs typeface="Calibri Light" panose="020F0302020204030204" pitchFamily="34" charset="0"/>
               </a:rPr>
-              <a:t>1. Coreference pipeline</a:t>
+              <a:t>	1</a:t>
+            </a:r>
+            <a:r>
+              <a:rPr lang="en-US" sz="1400" baseline="30000" dirty="0">
+                <a:solidFill>
+                  <a:schemeClr val="tx1"/>
+                </a:solidFill>
+                <a:latin typeface="Calibri Light" panose="020F0302020204030204" pitchFamily="34" charset="0"/>
+                <a:cs typeface="Calibri Light" panose="020F0302020204030204" pitchFamily="34" charset="0"/>
+              </a:rPr>
+              <a:t>st</a:t>
+            </a:r>
+            <a:r>
+              <a:rPr lang="en-US" sz="1400" dirty="0">
+                <a:solidFill>
+                  <a:schemeClr val="tx1"/>
+                </a:solidFill>
+                <a:latin typeface="Calibri Light" panose="020F0302020204030204" pitchFamily="34" charset="0"/>
+                <a:cs typeface="Calibri Light" panose="020F0302020204030204" pitchFamily="34" charset="0"/>
+              </a:rPr>
+              <a:t> stage – Coreference pipeline</a:t>
             </a:r>
             <a:r>
               <a:rPr lang="en-US" sz="1400" baseline="30000" dirty="0">
@@ -6689,10 +6606,11 @@
             </a:r>
           </a:p>
           <a:p>
-            <a:pPr algn="just" defTabSz="521208">
+            <a:pPr marL="0" lvl="1" indent="0" algn="just" defTabSz="521208">
               <a:spcBef>
                 <a:spcPts val="200"/>
               </a:spcBef>
+              <a:buNone/>
               <a:defRPr sz="1254">
                 <a:solidFill>
                   <a:schemeClr val="accent1"/>
@@ -6711,10 +6629,11 @@
             </a:r>
           </a:p>
           <a:p>
-            <a:pPr algn="just" defTabSz="521208">
+            <a:pPr marL="0" lvl="1" indent="0" algn="just" defTabSz="521208">
               <a:spcBef>
                 <a:spcPts val="200"/>
               </a:spcBef>
+              <a:buNone/>
               <a:defRPr sz="1254">
                 <a:solidFill>
                   <a:schemeClr val="accent1"/>
@@ -6756,7 +6675,7 @@
                 <a:latin typeface="Calibri Light" panose="020F0302020204030204" pitchFamily="34" charset="0"/>
                 <a:cs typeface="Calibri Light" panose="020F0302020204030204" pitchFamily="34" charset="0"/>
               </a:rPr>
-              <a:t> - An LSTM over the </a:t>
+              <a:t> – An LSTM over the </a:t>
             </a:r>
             <a:r>
               <a:rPr lang="en-US" sz="1400" dirty="0" err="1">
@@ -6800,10 +6719,11 @@
             </a:r>
           </a:p>
           <a:p>
-            <a:pPr algn="just" defTabSz="521208">
+            <a:pPr marL="0" lvl="1" indent="0" algn="just" defTabSz="521208">
               <a:spcBef>
                 <a:spcPts val="200"/>
               </a:spcBef>
+              <a:buNone/>
               <a:defRPr sz="1254">
                 <a:solidFill>
                   <a:schemeClr val="accent1"/>
@@ -6845,14 +6765,15 @@
                 <a:latin typeface="Calibri Light" panose="020F0302020204030204" pitchFamily="34" charset="0"/>
                 <a:cs typeface="Calibri Light" panose="020F0302020204030204" pitchFamily="34" charset="0"/>
               </a:rPr>
-              <a:t> - A lightweight CNN with two output channels. </a:t>
-            </a:r>
-          </a:p>
-          <a:p>
-            <a:pPr algn="just" defTabSz="521208">
+              <a:t> – A lightweight CNN with two output channels. </a:t>
+            </a:r>
+          </a:p>
+          <a:p>
+            <a:pPr marL="0" lvl="1" indent="0" algn="just" defTabSz="521208">
               <a:spcBef>
                 <a:spcPts val="200"/>
               </a:spcBef>
+              <a:buNone/>
               <a:defRPr sz="1254">
                 <a:solidFill>
                   <a:schemeClr val="accent1"/>
@@ -6868,6 +6789,314 @@
             </a:endParaRPr>
           </a:p>
           <a:p>
+            <a:pPr marL="0" lvl="1" indent="0" algn="just" defTabSz="521208">
+              <a:spcBef>
+                <a:spcPts val="200"/>
+              </a:spcBef>
+              <a:buNone/>
+              <a:defRPr sz="1254">
+                <a:solidFill>
+                  <a:schemeClr val="accent1"/>
+                </a:solidFill>
+              </a:defRPr>
+            </a:pPr>
+            <a:r>
+              <a:rPr lang="en-US" sz="1400" dirty="0">
+                <a:solidFill>
+                  <a:schemeClr val="tx1"/>
+                </a:solidFill>
+                <a:latin typeface="Calibri Light" panose="020F0302020204030204" pitchFamily="34" charset="0"/>
+                <a:cs typeface="Calibri Light" panose="020F0302020204030204" pitchFamily="34" charset="0"/>
+              </a:rPr>
+              <a:t>	2</a:t>
+            </a:r>
+            <a:r>
+              <a:rPr lang="en-US" sz="1400" baseline="30000" dirty="0">
+                <a:solidFill>
+                  <a:schemeClr val="tx1"/>
+                </a:solidFill>
+                <a:latin typeface="Calibri Light" panose="020F0302020204030204" pitchFamily="34" charset="0"/>
+                <a:cs typeface="Calibri Light" panose="020F0302020204030204" pitchFamily="34" charset="0"/>
+              </a:rPr>
+              <a:t>nd</a:t>
+            </a:r>
+            <a:r>
+              <a:rPr lang="en-US" sz="1400" dirty="0">
+                <a:solidFill>
+                  <a:schemeClr val="tx1"/>
+                </a:solidFill>
+                <a:latin typeface="Calibri Light" panose="020F0302020204030204" pitchFamily="34" charset="0"/>
+                <a:cs typeface="Calibri Light" panose="020F0302020204030204" pitchFamily="34" charset="0"/>
+              </a:rPr>
+              <a:t> and 3</a:t>
+            </a:r>
+            <a:r>
+              <a:rPr lang="en-US" sz="1400" baseline="30000" dirty="0">
+                <a:solidFill>
+                  <a:schemeClr val="tx1"/>
+                </a:solidFill>
+                <a:latin typeface="Calibri Light" panose="020F0302020204030204" pitchFamily="34" charset="0"/>
+                <a:cs typeface="Calibri Light" panose="020F0302020204030204" pitchFamily="34" charset="0"/>
+              </a:rPr>
+              <a:t>rd</a:t>
+            </a:r>
+            <a:r>
+              <a:rPr lang="en-US" sz="1400" dirty="0">
+                <a:solidFill>
+                  <a:schemeClr val="tx1"/>
+                </a:solidFill>
+                <a:latin typeface="Calibri Light" panose="020F0302020204030204" pitchFamily="34" charset="0"/>
+                <a:cs typeface="Calibri Light" panose="020F0302020204030204" pitchFamily="34" charset="0"/>
+              </a:rPr>
+              <a:t> stage – English core transformer pipeline</a:t>
+            </a:r>
+            <a:r>
+              <a:rPr lang="en-US" sz="1400" baseline="30000" dirty="0">
+                <a:solidFill>
+                  <a:schemeClr val="tx1"/>
+                </a:solidFill>
+                <a:latin typeface="Calibri Light" panose="020F0302020204030204" pitchFamily="34" charset="0"/>
+                <a:cs typeface="Calibri Light" panose="020F0302020204030204" pitchFamily="34" charset="0"/>
+              </a:rPr>
+              <a:t>[2]</a:t>
+            </a:r>
+          </a:p>
+          <a:p>
+            <a:pPr marL="0" lvl="1" indent="0" algn="just" defTabSz="521208">
+              <a:spcBef>
+                <a:spcPts val="200"/>
+              </a:spcBef>
+              <a:buNone/>
+              <a:defRPr sz="1254">
+                <a:solidFill>
+                  <a:schemeClr val="accent1"/>
+                </a:solidFill>
+              </a:defRPr>
+            </a:pPr>
+            <a:r>
+              <a:rPr lang="en-US" sz="1400" dirty="0">
+                <a:solidFill>
+                  <a:schemeClr val="tx1"/>
+                </a:solidFill>
+                <a:latin typeface="Calibri Light" panose="020F0302020204030204" pitchFamily="34" charset="0"/>
+                <a:cs typeface="Calibri Light" panose="020F0302020204030204" pitchFamily="34" charset="0"/>
+              </a:rPr>
+              <a:t>	It is a production-grade modular pipeline, in its basic form consist of tagger, parser, </a:t>
+            </a:r>
+          </a:p>
+          <a:p>
+            <a:pPr marL="0" lvl="1" indent="0" algn="just" defTabSz="521208">
+              <a:spcBef>
+                <a:spcPts val="200"/>
+              </a:spcBef>
+              <a:buNone/>
+              <a:defRPr sz="1254">
+                <a:solidFill>
+                  <a:schemeClr val="accent1"/>
+                </a:solidFill>
+              </a:defRPr>
+            </a:pPr>
+            <a:r>
+              <a:rPr lang="en-US" sz="1400" dirty="0">
+                <a:solidFill>
+                  <a:schemeClr val="tx1"/>
+                </a:solidFill>
+                <a:latin typeface="Calibri Light" panose="020F0302020204030204" pitchFamily="34" charset="0"/>
+                <a:cs typeface="Calibri Light" panose="020F0302020204030204" pitchFamily="34" charset="0"/>
+              </a:rPr>
+              <a:t>	</a:t>
+            </a:r>
+            <a:r>
+              <a:rPr lang="en-US" sz="1400" dirty="0" err="1">
+                <a:solidFill>
+                  <a:schemeClr val="tx1"/>
+                </a:solidFill>
+                <a:latin typeface="Calibri Light" panose="020F0302020204030204" pitchFamily="34" charset="0"/>
+                <a:cs typeface="Calibri Light" panose="020F0302020204030204" pitchFamily="34" charset="0"/>
+              </a:rPr>
+              <a:t>attribute_ruler</a:t>
+            </a:r>
+            <a:r>
+              <a:rPr lang="en-US" sz="1400" dirty="0">
+                <a:solidFill>
+                  <a:schemeClr val="tx1"/>
+                </a:solidFill>
+                <a:latin typeface="Calibri Light" panose="020F0302020204030204" pitchFamily="34" charset="0"/>
+                <a:cs typeface="Calibri Light" panose="020F0302020204030204" pitchFamily="34" charset="0"/>
+              </a:rPr>
+              <a:t>, </a:t>
+            </a:r>
+            <a:r>
+              <a:rPr lang="en-US" sz="1400" dirty="0" err="1">
+                <a:solidFill>
+                  <a:schemeClr val="tx1"/>
+                </a:solidFill>
+                <a:latin typeface="Calibri Light" panose="020F0302020204030204" pitchFamily="34" charset="0"/>
+                <a:cs typeface="Calibri Light" panose="020F0302020204030204" pitchFamily="34" charset="0"/>
+              </a:rPr>
+              <a:t>lemmatizer</a:t>
+            </a:r>
+            <a:r>
+              <a:rPr lang="en-US" sz="1400" dirty="0">
+                <a:solidFill>
+                  <a:schemeClr val="tx1"/>
+                </a:solidFill>
+                <a:latin typeface="Calibri Light" panose="020F0302020204030204" pitchFamily="34" charset="0"/>
+                <a:cs typeface="Calibri Light" panose="020F0302020204030204" pitchFamily="34" charset="0"/>
+              </a:rPr>
+              <a:t> and </a:t>
+            </a:r>
+            <a:r>
+              <a:rPr lang="en-US" sz="1400" dirty="0" err="1">
+                <a:solidFill>
+                  <a:schemeClr val="tx1"/>
+                </a:solidFill>
+                <a:latin typeface="Calibri Light" panose="020F0302020204030204" pitchFamily="34" charset="0"/>
+                <a:cs typeface="Calibri Light" panose="020F0302020204030204" pitchFamily="34" charset="0"/>
+              </a:rPr>
+              <a:t>ner</a:t>
+            </a:r>
+            <a:r>
+              <a:rPr lang="en-US" sz="1400" dirty="0">
+                <a:solidFill>
+                  <a:schemeClr val="tx1"/>
+                </a:solidFill>
+                <a:latin typeface="Calibri Light" panose="020F0302020204030204" pitchFamily="34" charset="0"/>
+                <a:cs typeface="Calibri Light" panose="020F0302020204030204" pitchFamily="34" charset="0"/>
+              </a:rPr>
+              <a:t> components.</a:t>
+            </a:r>
+          </a:p>
+          <a:p>
+            <a:pPr marL="0" lvl="1" indent="0" algn="just" defTabSz="521208">
+              <a:spcBef>
+                <a:spcPts val="200"/>
+              </a:spcBef>
+              <a:buNone/>
+              <a:defRPr sz="1254">
+                <a:solidFill>
+                  <a:schemeClr val="accent1"/>
+                </a:solidFill>
+              </a:defRPr>
+            </a:pPr>
+            <a:endParaRPr lang="en-US" sz="1400" dirty="0">
+              <a:solidFill>
+                <a:schemeClr val="tx1"/>
+              </a:solidFill>
+              <a:latin typeface="Calibri Light" panose="020F0302020204030204" pitchFamily="34" charset="0"/>
+              <a:cs typeface="Calibri Light" panose="020F0302020204030204" pitchFamily="34" charset="0"/>
+            </a:endParaRPr>
+          </a:p>
+          <a:p>
+            <a:pPr marL="0" lvl="1" indent="0" algn="just" defTabSz="521208">
+              <a:spcBef>
+                <a:spcPts val="200"/>
+              </a:spcBef>
+              <a:buNone/>
+              <a:defRPr sz="1254">
+                <a:solidFill>
+                  <a:schemeClr val="accent1"/>
+                </a:solidFill>
+              </a:defRPr>
+            </a:pPr>
+            <a:r>
+              <a:rPr lang="en-US" sz="1400" dirty="0">
+                <a:solidFill>
+                  <a:schemeClr val="tx1"/>
+                </a:solidFill>
+                <a:latin typeface="Calibri Light" panose="020F0302020204030204" pitchFamily="34" charset="0"/>
+                <a:cs typeface="Calibri Light" panose="020F0302020204030204" pitchFamily="34" charset="0"/>
+              </a:rPr>
+              <a:t>	4</a:t>
+            </a:r>
+            <a:r>
+              <a:rPr lang="en-US" sz="1400" baseline="30000" dirty="0">
+                <a:solidFill>
+                  <a:schemeClr val="tx1"/>
+                </a:solidFill>
+                <a:latin typeface="Calibri Light" panose="020F0302020204030204" pitchFamily="34" charset="0"/>
+                <a:cs typeface="Calibri Light" panose="020F0302020204030204" pitchFamily="34" charset="0"/>
+              </a:rPr>
+              <a:t>th</a:t>
+            </a:r>
+            <a:r>
+              <a:rPr lang="en-US" sz="1400" dirty="0">
+                <a:solidFill>
+                  <a:schemeClr val="tx1"/>
+                </a:solidFill>
+                <a:latin typeface="Calibri Light" panose="020F0302020204030204" pitchFamily="34" charset="0"/>
+                <a:cs typeface="Calibri Light" panose="020F0302020204030204" pitchFamily="34" charset="0"/>
+              </a:rPr>
+              <a:t> stage – Fine-tuned BERT</a:t>
+            </a:r>
+            <a:r>
+              <a:rPr lang="en-US" sz="1400" baseline="30000" dirty="0">
+                <a:solidFill>
+                  <a:schemeClr val="tx1"/>
+                </a:solidFill>
+                <a:latin typeface="Calibri Light" panose="020F0302020204030204" pitchFamily="34" charset="0"/>
+                <a:cs typeface="Calibri Light" panose="020F0302020204030204" pitchFamily="34" charset="0"/>
+              </a:rPr>
+              <a:t>[3]</a:t>
+            </a:r>
+            <a:r>
+              <a:rPr lang="en-US" sz="1400" dirty="0">
+                <a:solidFill>
+                  <a:schemeClr val="tx1"/>
+                </a:solidFill>
+                <a:latin typeface="Calibri Light" panose="020F0302020204030204" pitchFamily="34" charset="0"/>
+                <a:cs typeface="Calibri Light" panose="020F0302020204030204" pitchFamily="34" charset="0"/>
+              </a:rPr>
+              <a:t> model</a:t>
+            </a:r>
+          </a:p>
+          <a:p>
+            <a:pPr marL="0" lvl="1" indent="0" algn="just" defTabSz="521208">
+              <a:spcBef>
+                <a:spcPts val="200"/>
+              </a:spcBef>
+              <a:buNone/>
+              <a:defRPr sz="1254">
+                <a:solidFill>
+                  <a:schemeClr val="accent1"/>
+                </a:solidFill>
+              </a:defRPr>
+            </a:pPr>
+            <a:r>
+              <a:rPr lang="en-US" sz="1400" dirty="0">
+                <a:solidFill>
+                  <a:schemeClr val="tx1"/>
+                </a:solidFill>
+                <a:latin typeface="Calibri Light" panose="020F0302020204030204" pitchFamily="34" charset="0"/>
+                <a:cs typeface="Calibri Light" panose="020F0302020204030204" pitchFamily="34" charset="0"/>
+              </a:rPr>
+              <a:t>	An annotated dataset was created from ESG report from multiple DAX100 companies </a:t>
+            </a:r>
+          </a:p>
+          <a:p>
+            <a:pPr marL="0" lvl="1" indent="0" algn="just" defTabSz="521208">
+              <a:spcBef>
+                <a:spcPts val="200"/>
+              </a:spcBef>
+              <a:buNone/>
+              <a:defRPr sz="1254">
+                <a:solidFill>
+                  <a:schemeClr val="accent1"/>
+                </a:solidFill>
+              </a:defRPr>
+            </a:pPr>
+            <a:r>
+              <a:rPr lang="en-US" sz="1400" dirty="0">
+                <a:solidFill>
+                  <a:schemeClr val="tx1"/>
+                </a:solidFill>
+                <a:latin typeface="Calibri Light" panose="020F0302020204030204" pitchFamily="34" charset="0"/>
+                <a:cs typeface="Calibri Light" panose="020F0302020204030204" pitchFamily="34" charset="0"/>
+              </a:rPr>
+              <a:t>	to fine-tune a pre-trained model.</a:t>
+            </a:r>
+          </a:p>
+          <a:p>
             <a:pPr algn="just" defTabSz="521208">
               <a:spcBef>
                 <a:spcPts val="200"/>
@@ -6878,26 +7107,13 @@
                 </a:solidFill>
               </a:defRPr>
             </a:pPr>
-            <a:r>
-              <a:rPr lang="en-US" sz="1400" dirty="0">
-                <a:solidFill>
-                  <a:schemeClr val="tx1"/>
-                </a:solidFill>
-                <a:latin typeface="Calibri Light" panose="020F0302020204030204" pitchFamily="34" charset="0"/>
-                <a:cs typeface="Calibri Light" panose="020F0302020204030204" pitchFamily="34" charset="0"/>
-              </a:rPr>
-              <a:t>2. English core transformer pipeline</a:t>
-            </a:r>
-            <a:r>
-              <a:rPr lang="en-US" sz="1400" baseline="30000" dirty="0">
-                <a:solidFill>
-                  <a:schemeClr val="tx1"/>
-                </a:solidFill>
-                <a:latin typeface="Calibri Light" panose="020F0302020204030204" pitchFamily="34" charset="0"/>
-                <a:cs typeface="Calibri Light" panose="020F0302020204030204" pitchFamily="34" charset="0"/>
-              </a:rPr>
-              <a:t>[2]</a:t>
-            </a:r>
+            <a:endParaRPr lang="en-US" sz="1400" dirty="0">
+              <a:solidFill>
+                <a:schemeClr val="tx1"/>
+              </a:solidFill>
+              <a:latin typeface="Calibri Light" panose="020F0302020204030204" pitchFamily="34" charset="0"/>
+              <a:cs typeface="Calibri Light" panose="020F0302020204030204" pitchFamily="34" charset="0"/>
+            </a:endParaRPr>
           </a:p>
           <a:p>
             <a:pPr algn="just" defTabSz="521208">
@@ -6910,76 +7126,13 @@
                 </a:solidFill>
               </a:defRPr>
             </a:pPr>
-            <a:r>
-              <a:rPr lang="en-US" sz="1400" dirty="0">
-                <a:solidFill>
-                  <a:schemeClr val="tx1"/>
-                </a:solidFill>
-                <a:latin typeface="Calibri Light" panose="020F0302020204030204" pitchFamily="34" charset="0"/>
-                <a:cs typeface="Calibri Light" panose="020F0302020204030204" pitchFamily="34" charset="0"/>
-              </a:rPr>
-              <a:t>	It is a production-grade modular pipeline, in its basic form consist of tagger, parser, </a:t>
-            </a:r>
-            <a:r>
-              <a:rPr lang="en-US" sz="1400" dirty="0" err="1">
-                <a:solidFill>
-                  <a:schemeClr val="tx1"/>
-                </a:solidFill>
-                <a:latin typeface="Calibri Light" panose="020F0302020204030204" pitchFamily="34" charset="0"/>
-                <a:cs typeface="Calibri Light" panose="020F0302020204030204" pitchFamily="34" charset="0"/>
-              </a:rPr>
-              <a:t>attribute_ruler</a:t>
-            </a:r>
-            <a:r>
-              <a:rPr lang="en-US" sz="1400" dirty="0">
-                <a:solidFill>
-                  <a:schemeClr val="tx1"/>
-                </a:solidFill>
-                <a:latin typeface="Calibri Light" panose="020F0302020204030204" pitchFamily="34" charset="0"/>
-                <a:cs typeface="Calibri Light" panose="020F0302020204030204" pitchFamily="34" charset="0"/>
-              </a:rPr>
-              <a:t>, 	</a:t>
-            </a:r>
-            <a:r>
-              <a:rPr lang="en-US" sz="1400" dirty="0" err="1">
-                <a:solidFill>
-                  <a:schemeClr val="tx1"/>
-                </a:solidFill>
-                <a:latin typeface="Calibri Light" panose="020F0302020204030204" pitchFamily="34" charset="0"/>
-                <a:cs typeface="Calibri Light" panose="020F0302020204030204" pitchFamily="34" charset="0"/>
-              </a:rPr>
-              <a:t>lemmatizer</a:t>
-            </a:r>
-            <a:r>
-              <a:rPr lang="en-US" sz="1400" dirty="0">
-                <a:solidFill>
-                  <a:schemeClr val="tx1"/>
-                </a:solidFill>
-                <a:latin typeface="Calibri Light" panose="020F0302020204030204" pitchFamily="34" charset="0"/>
-                <a:cs typeface="Calibri Light" panose="020F0302020204030204" pitchFamily="34" charset="0"/>
-              </a:rPr>
-              <a:t> and </a:t>
-            </a:r>
-            <a:r>
-              <a:rPr lang="en-US" sz="1400" dirty="0" err="1">
-                <a:solidFill>
-                  <a:schemeClr val="tx1"/>
-                </a:solidFill>
-                <a:latin typeface="Calibri Light" panose="020F0302020204030204" pitchFamily="34" charset="0"/>
-                <a:cs typeface="Calibri Light" panose="020F0302020204030204" pitchFamily="34" charset="0"/>
-              </a:rPr>
-              <a:t>ner</a:t>
-            </a:r>
-            <a:r>
-              <a:rPr lang="en-US" sz="1400" dirty="0">
-                <a:solidFill>
-                  <a:schemeClr val="tx1"/>
-                </a:solidFill>
-                <a:latin typeface="Calibri Light" panose="020F0302020204030204" pitchFamily="34" charset="0"/>
-                <a:cs typeface="Calibri Light" panose="020F0302020204030204" pitchFamily="34" charset="0"/>
-              </a:rPr>
-              <a:t> components.</a:t>
-            </a:r>
+            <a:endParaRPr lang="en-US" sz="1400" dirty="0">
+              <a:solidFill>
+                <a:schemeClr val="tx1"/>
+              </a:solidFill>
+              <a:latin typeface="Calibri Light" panose="020F0302020204030204" pitchFamily="34" charset="0"/>
+              <a:cs typeface="Calibri Light" panose="020F0302020204030204" pitchFamily="34" charset="0"/>
+            </a:endParaRPr>
           </a:p>
         </p:txBody>
       </p:sp>
@@ -7046,7 +7199,7 @@
           </a:ln>
           <a:extLst>
             <a:ext uri="{C572A759-6A51-4108-AA02-DFA0A04FC94B}">
-              <ma14:wrappingTextBoxFlag xmlns="" xmlns:m="http://schemas.openxmlformats.org/officeDocument/2006/math" xmlns:a14="http://schemas.microsoft.com/office/drawing/2010/main" xmlns:ma14="http://schemas.microsoft.com/office/mac/drawingml/2011/main" val="1"/>
+              <ma14:wrappingTextBoxFlag xmlns:ma14="http://schemas.microsoft.com/office/mac/drawingml/2011/main" xmlns:a14="http://schemas.microsoft.com/office/drawing/2010/main" xmlns:m="http://schemas.openxmlformats.org/officeDocument/2006/math" xmlns="" val="1"/>
             </a:ext>
           </a:extLst>
         </p:spPr>
@@ -7101,7 +7254,7 @@
           </a:ln>
           <a:extLst>
             <a:ext uri="{C572A759-6A51-4108-AA02-DFA0A04FC94B}">
-              <ma14:wrappingTextBoxFlag xmlns="" xmlns:m="http://schemas.openxmlformats.org/officeDocument/2006/math" xmlns:a14="http://schemas.microsoft.com/office/drawing/2010/main" xmlns:ma14="http://schemas.microsoft.com/office/mac/drawingml/2011/main" val="1"/>
+              <ma14:wrappingTextBoxFlag xmlns:ma14="http://schemas.microsoft.com/office/mac/drawingml/2011/main" xmlns:a14="http://schemas.microsoft.com/office/drawing/2010/main" xmlns:m="http://schemas.openxmlformats.org/officeDocument/2006/math" xmlns="" val="1"/>
             </a:ext>
           </a:extLst>
         </p:spPr>
@@ -7152,7 +7305,7 @@
           </a:ln>
           <a:extLst>
             <a:ext uri="{C572A759-6A51-4108-AA02-DFA0A04FC94B}">
-              <ma14:wrappingTextBoxFlag xmlns="" xmlns:m="http://schemas.openxmlformats.org/officeDocument/2006/math" xmlns:a14="http://schemas.microsoft.com/office/drawing/2010/main" xmlns:ma14="http://schemas.microsoft.com/office/mac/drawingml/2011/main" val="1"/>
+              <ma14:wrappingTextBoxFlag xmlns:ma14="http://schemas.microsoft.com/office/mac/drawingml/2011/main" xmlns:a14="http://schemas.microsoft.com/office/drawing/2010/main" xmlns:m="http://schemas.openxmlformats.org/officeDocument/2006/math" xmlns="" val="1"/>
             </a:ext>
           </a:extLst>
         </p:spPr>
@@ -7255,7 +7408,7 @@
                 <a:latin typeface="Calibri Light" panose="020F0302020204030204" pitchFamily="34" charset="0"/>
                 <a:cs typeface="Calibri Light" panose="020F0302020204030204" pitchFamily="34" charset="0"/>
               </a:rPr>
-              <a:t>[3]</a:t>
+              <a:t>[4]</a:t>
             </a:r>
             <a:r>
               <a:rPr lang="en-US" sz="1600" dirty="0">
@@ -7269,7 +7422,7 @@
             </a:r>
           </a:p>
           <a:p>
-            <a:pPr defTabSz="521208">
+            <a:pPr algn="just" defTabSz="521208">
               <a:spcBef>
                 <a:spcPts val="200"/>
               </a:spcBef>
@@ -7288,7 +7441,7 @@
             </a:endParaRPr>
           </a:p>
           <a:p>
-            <a:pPr defTabSz="521208">
+            <a:pPr algn="just" defTabSz="521208">
               <a:spcBef>
                 <a:spcPts val="200"/>
               </a:spcBef>
@@ -7307,7 +7460,7 @@
             </a:endParaRPr>
           </a:p>
           <a:p>
-            <a:pPr algn="ctr" defTabSz="521208">
+            <a:pPr defTabSz="521208">
               <a:spcBef>
                 <a:spcPts val="200"/>
               </a:spcBef>
@@ -7345,7 +7498,7 @@
             </a:endParaRPr>
           </a:p>
           <a:p>
-            <a:pPr defTabSz="521208">
+            <a:pPr algn="ctr" defTabSz="521208">
               <a:spcBef>
                 <a:spcPts val="200"/>
               </a:spcBef>
@@ -7374,6 +7527,44 @@
                 </a:solidFill>
               </a:defRPr>
             </a:pPr>
+            <a:endParaRPr lang="en-US" sz="1600" dirty="0">
+              <a:solidFill>
+                <a:schemeClr val="tx1"/>
+              </a:solidFill>
+              <a:latin typeface="Calibri Light" panose="020F0302020204030204" pitchFamily="34" charset="0"/>
+              <a:cs typeface="Calibri Light" panose="020F0302020204030204" pitchFamily="34" charset="0"/>
+            </a:endParaRPr>
+          </a:p>
+          <a:p>
+            <a:pPr defTabSz="521208">
+              <a:spcBef>
+                <a:spcPts val="200"/>
+              </a:spcBef>
+              <a:defRPr sz="1254">
+                <a:solidFill>
+                  <a:schemeClr val="accent1"/>
+                </a:solidFill>
+              </a:defRPr>
+            </a:pPr>
+            <a:endParaRPr lang="en-US" sz="1600" dirty="0">
+              <a:solidFill>
+                <a:schemeClr val="tx1"/>
+              </a:solidFill>
+              <a:latin typeface="Calibri Light" panose="020F0302020204030204" pitchFamily="34" charset="0"/>
+              <a:cs typeface="Calibri Light" panose="020F0302020204030204" pitchFamily="34" charset="0"/>
+            </a:endParaRPr>
+          </a:p>
+          <a:p>
+            <a:pPr defTabSz="521208">
+              <a:spcBef>
+                <a:spcPts val="200"/>
+              </a:spcBef>
+              <a:defRPr sz="1254">
+                <a:solidFill>
+                  <a:schemeClr val="accent1"/>
+                </a:solidFill>
+              </a:defRPr>
+            </a:pPr>
             <a:endParaRPr lang="en-US" sz="1200" dirty="0">
               <a:solidFill>
                 <a:schemeClr val="tx1"/>
@@ -7411,7 +7602,7 @@
                 <a:latin typeface="Calibri Light" panose="020F0302020204030204" pitchFamily="34" charset="0"/>
                 <a:cs typeface="Calibri Light" panose="020F0302020204030204" pitchFamily="34" charset="0"/>
               </a:rPr>
-              <a:t>[4]</a:t>
+              <a:t>[5]</a:t>
             </a:r>
             <a:endParaRPr lang="en-US" sz="1200" dirty="0">
               <a:solidFill>
@@ -7489,7 +7680,7 @@
         </p:blipFill>
         <p:spPr>
           <a:xfrm>
-            <a:off x="2669764" y="3196580"/>
+            <a:off x="2669764" y="3501008"/>
             <a:ext cx="3873500" cy="952500"/>
           </a:xfrm>
           <a:prstGeom prst="rect">
@@ -7560,7 +7751,7 @@
           </a:ln>
           <a:extLst>
             <a:ext uri="{C572A759-6A51-4108-AA02-DFA0A04FC94B}">
-              <ma14:wrappingTextBoxFlag xmlns:ma14="http://schemas.microsoft.com/office/mac/drawingml/2011/main" xmlns:a14="http://schemas.microsoft.com/office/drawing/2010/main" xmlns:m="http://schemas.openxmlformats.org/officeDocument/2006/math" xmlns="" val="1"/>
+              <ma14:wrappingTextBoxFlag xmlns="" xmlns:m="http://schemas.openxmlformats.org/officeDocument/2006/math" xmlns:a14="http://schemas.microsoft.com/office/drawing/2010/main" xmlns:ma14="http://schemas.microsoft.com/office/mac/drawingml/2011/main" val="1"/>
             </a:ext>
           </a:extLst>
         </p:spPr>
@@ -7580,15 +7771,7 @@
           <a:p>
             <a:r>
               <a:rPr lang="de-DE" sz="2400" b="0" dirty="0"/>
-              <a:t>2. </a:t>
-            </a:r>
-            <a:r>
-              <a:rPr lang="de-DE" sz="2400" b="0" dirty="0" err="1"/>
-              <a:t>Named</a:t>
-            </a:r>
-            <a:r>
-              <a:rPr lang="de-DE" sz="2400" b="0" dirty="0"/>
-              <a:t> Entity Recognition</a:t>
+              <a:t>2. Named Entity Recognition</a:t>
             </a:r>
           </a:p>
         </p:txBody>
@@ -7748,6 +7931,44 @@
             </a:endParaRPr>
           </a:p>
           <a:p>
+            <a:pPr defTabSz="521208">
+              <a:spcBef>
+                <a:spcPts val="200"/>
+              </a:spcBef>
+              <a:defRPr sz="1254">
+                <a:solidFill>
+                  <a:schemeClr val="accent1"/>
+                </a:solidFill>
+              </a:defRPr>
+            </a:pPr>
+            <a:endParaRPr lang="en-US" sz="1600" dirty="0">
+              <a:solidFill>
+                <a:schemeClr val="tx1"/>
+              </a:solidFill>
+              <a:latin typeface="Calibri Light" panose="020F0302020204030204" pitchFamily="34" charset="0"/>
+              <a:cs typeface="Calibri Light" panose="020F0302020204030204" pitchFamily="34" charset="0"/>
+            </a:endParaRPr>
+          </a:p>
+          <a:p>
+            <a:pPr algn="ctr" defTabSz="521208">
+              <a:spcBef>
+                <a:spcPts val="200"/>
+              </a:spcBef>
+              <a:defRPr sz="1254">
+                <a:solidFill>
+                  <a:schemeClr val="accent1"/>
+                </a:solidFill>
+              </a:defRPr>
+            </a:pPr>
+            <a:endParaRPr lang="en-US" sz="1600" dirty="0">
+              <a:solidFill>
+                <a:schemeClr val="tx1"/>
+              </a:solidFill>
+              <a:latin typeface="Calibri Light" panose="020F0302020204030204" pitchFamily="34" charset="0"/>
+              <a:cs typeface="Calibri Light" panose="020F0302020204030204" pitchFamily="34" charset="0"/>
+            </a:endParaRPr>
+          </a:p>
+          <a:p>
             <a:pPr algn="ctr" defTabSz="521208">
               <a:spcBef>
                 <a:spcPts val="200"/>
@@ -7894,7 +8115,7 @@
         </p:blipFill>
         <p:spPr>
           <a:xfrm>
-            <a:off x="2387600" y="3111748"/>
+            <a:off x="2226219" y="3543796"/>
             <a:ext cx="4368800" cy="749300"/>
           </a:xfrm>
           <a:prstGeom prst="rect">
@@ -7965,7 +8186,7 @@
           </a:ln>
           <a:extLst>
             <a:ext uri="{C572A759-6A51-4108-AA02-DFA0A04FC94B}">
-              <ma14:wrappingTextBoxFlag xmlns="" xmlns:m="http://schemas.openxmlformats.org/officeDocument/2006/math" xmlns:a14="http://schemas.microsoft.com/office/drawing/2010/main" xmlns:ma14="http://schemas.microsoft.com/office/mac/drawingml/2011/main" val="1"/>
+              <ma14:wrappingTextBoxFlag xmlns:ma14="http://schemas.microsoft.com/office/mac/drawingml/2011/main" xmlns:a14="http://schemas.microsoft.com/office/drawing/2010/main" xmlns:m="http://schemas.openxmlformats.org/officeDocument/2006/math" xmlns="" val="1"/>
             </a:ext>
           </a:extLst>
         </p:spPr>
@@ -8185,6 +8406,44 @@
             </a:endParaRPr>
           </a:p>
           <a:p>
+            <a:pPr defTabSz="521208">
+              <a:spcBef>
+                <a:spcPts val="200"/>
+              </a:spcBef>
+              <a:defRPr sz="1254">
+                <a:solidFill>
+                  <a:schemeClr val="accent1"/>
+                </a:solidFill>
+              </a:defRPr>
+            </a:pPr>
+            <a:endParaRPr lang="en-US" sz="1600" dirty="0">
+              <a:solidFill>
+                <a:schemeClr val="tx1"/>
+              </a:solidFill>
+              <a:latin typeface="Calibri Light" panose="020F0302020204030204" pitchFamily="34" charset="0"/>
+              <a:cs typeface="Calibri Light" panose="020F0302020204030204" pitchFamily="34" charset="0"/>
+            </a:endParaRPr>
+          </a:p>
+          <a:p>
+            <a:pPr defTabSz="521208">
+              <a:spcBef>
+                <a:spcPts val="200"/>
+              </a:spcBef>
+              <a:defRPr sz="1254">
+                <a:solidFill>
+                  <a:schemeClr val="accent1"/>
+                </a:solidFill>
+              </a:defRPr>
+            </a:pPr>
+            <a:endParaRPr lang="en-US" sz="1600" dirty="0">
+              <a:solidFill>
+                <a:schemeClr val="tx1"/>
+              </a:solidFill>
+              <a:latin typeface="Calibri Light" panose="020F0302020204030204" pitchFamily="34" charset="0"/>
+              <a:cs typeface="Calibri Light" panose="020F0302020204030204" pitchFamily="34" charset="0"/>
+            </a:endParaRPr>
+          </a:p>
+          <a:p>
             <a:pPr marL="0" marR="0" lvl="0" indent="0" algn="ctr" defTabSz="521208" rtl="0" eaLnBrk="1" fontAlgn="auto" latinLnBrk="0" hangingPunct="1">
               <a:lnSpc>
                 <a:spcPct val="100000"/>
@@ -8273,7 +8532,7 @@
         </p:blipFill>
         <p:spPr>
           <a:xfrm>
-            <a:off x="1295400" y="3162300"/>
+            <a:off x="1295400" y="3615680"/>
             <a:ext cx="6553200" cy="533400"/>
           </a:xfrm>
           <a:prstGeom prst="rect">
@@ -8344,7 +8603,7 @@
           </a:ln>
           <a:extLst>
             <a:ext uri="{C572A759-6A51-4108-AA02-DFA0A04FC94B}">
-              <ma14:wrappingTextBoxFlag xmlns:ma14="http://schemas.microsoft.com/office/mac/drawingml/2011/main" xmlns:a14="http://schemas.microsoft.com/office/drawing/2010/main" xmlns:m="http://schemas.openxmlformats.org/officeDocument/2006/math" xmlns="" val="1"/>
+              <ma14:wrappingTextBoxFlag xmlns="" xmlns:m="http://schemas.openxmlformats.org/officeDocument/2006/math" xmlns:a14="http://schemas.microsoft.com/office/drawing/2010/main" xmlns:ma14="http://schemas.microsoft.com/office/mac/drawingml/2011/main" val="1"/>
             </a:ext>
           </a:extLst>
         </p:spPr>
@@ -8461,6 +8720,232 @@
             </a:r>
           </a:p>
           <a:p>
+            <a:pPr defTabSz="521208">
+              <a:spcBef>
+                <a:spcPts val="200"/>
+              </a:spcBef>
+              <a:defRPr sz="1254">
+                <a:solidFill>
+                  <a:schemeClr val="accent1"/>
+                </a:solidFill>
+              </a:defRPr>
+            </a:pPr>
+            <a:endParaRPr lang="en-US" sz="1200" dirty="0">
+              <a:solidFill>
+                <a:schemeClr val="tx1"/>
+              </a:solidFill>
+              <a:latin typeface="Calibri Light" panose="020F0302020204030204" pitchFamily="34" charset="0"/>
+              <a:cs typeface="Calibri Light" panose="020F0302020204030204" pitchFamily="34" charset="0"/>
+            </a:endParaRPr>
+          </a:p>
+          <a:p>
+            <a:pPr defTabSz="521208">
+              <a:spcBef>
+                <a:spcPts val="200"/>
+              </a:spcBef>
+              <a:defRPr sz="1254">
+                <a:solidFill>
+                  <a:schemeClr val="accent1"/>
+                </a:solidFill>
+              </a:defRPr>
+            </a:pPr>
+            <a:endParaRPr lang="en-US" sz="1200" dirty="0">
+              <a:solidFill>
+                <a:schemeClr val="tx1"/>
+              </a:solidFill>
+              <a:latin typeface="Calibri Light" panose="020F0302020204030204" pitchFamily="34" charset="0"/>
+              <a:cs typeface="Calibri Light" panose="020F0302020204030204" pitchFamily="34" charset="0"/>
+            </a:endParaRPr>
+          </a:p>
+          <a:p>
+            <a:pPr defTabSz="521208">
+              <a:spcBef>
+                <a:spcPts val="200"/>
+              </a:spcBef>
+              <a:defRPr sz="1254">
+                <a:solidFill>
+                  <a:schemeClr val="accent1"/>
+                </a:solidFill>
+              </a:defRPr>
+            </a:pPr>
+            <a:endParaRPr lang="en-US" sz="1200" dirty="0">
+              <a:solidFill>
+                <a:schemeClr val="tx1"/>
+              </a:solidFill>
+              <a:latin typeface="Calibri Light" panose="020F0302020204030204" pitchFamily="34" charset="0"/>
+              <a:cs typeface="Calibri Light" panose="020F0302020204030204" pitchFamily="34" charset="0"/>
+            </a:endParaRPr>
+          </a:p>
+          <a:p>
+            <a:pPr defTabSz="521208">
+              <a:spcBef>
+                <a:spcPts val="200"/>
+              </a:spcBef>
+              <a:defRPr sz="1254">
+                <a:solidFill>
+                  <a:schemeClr val="accent1"/>
+                </a:solidFill>
+              </a:defRPr>
+            </a:pPr>
+            <a:endParaRPr lang="en-US" sz="1200" dirty="0">
+              <a:solidFill>
+                <a:schemeClr val="tx1"/>
+              </a:solidFill>
+              <a:latin typeface="Calibri Light" panose="020F0302020204030204" pitchFamily="34" charset="0"/>
+              <a:cs typeface="Calibri Light" panose="020F0302020204030204" pitchFamily="34" charset="0"/>
+            </a:endParaRPr>
+          </a:p>
+          <a:p>
+            <a:pPr defTabSz="521208">
+              <a:spcBef>
+                <a:spcPts val="200"/>
+              </a:spcBef>
+              <a:defRPr sz="1254">
+                <a:solidFill>
+                  <a:schemeClr val="accent1"/>
+                </a:solidFill>
+              </a:defRPr>
+            </a:pPr>
+            <a:endParaRPr lang="en-US" sz="1200" dirty="0">
+              <a:solidFill>
+                <a:schemeClr val="tx1"/>
+              </a:solidFill>
+              <a:latin typeface="Calibri Light" panose="020F0302020204030204" pitchFamily="34" charset="0"/>
+              <a:cs typeface="Calibri Light" panose="020F0302020204030204" pitchFamily="34" charset="0"/>
+            </a:endParaRPr>
+          </a:p>
+          <a:p>
+            <a:pPr defTabSz="521208">
+              <a:spcBef>
+                <a:spcPts val="200"/>
+              </a:spcBef>
+              <a:defRPr sz="1254">
+                <a:solidFill>
+                  <a:schemeClr val="accent1"/>
+                </a:solidFill>
+              </a:defRPr>
+            </a:pPr>
+            <a:endParaRPr lang="en-US" sz="1200" dirty="0">
+              <a:solidFill>
+                <a:schemeClr val="tx1"/>
+              </a:solidFill>
+              <a:latin typeface="Calibri Light" panose="020F0302020204030204" pitchFamily="34" charset="0"/>
+              <a:cs typeface="Calibri Light" panose="020F0302020204030204" pitchFamily="34" charset="0"/>
+            </a:endParaRPr>
+          </a:p>
+          <a:p>
+            <a:pPr defTabSz="521208">
+              <a:spcBef>
+                <a:spcPts val="200"/>
+              </a:spcBef>
+              <a:defRPr sz="1254">
+                <a:solidFill>
+                  <a:schemeClr val="accent1"/>
+                </a:solidFill>
+              </a:defRPr>
+            </a:pPr>
+            <a:endParaRPr lang="en-US" sz="1200" dirty="0">
+              <a:solidFill>
+                <a:schemeClr val="tx1"/>
+              </a:solidFill>
+              <a:latin typeface="Calibri Light" panose="020F0302020204030204" pitchFamily="34" charset="0"/>
+              <a:cs typeface="Calibri Light" panose="020F0302020204030204" pitchFamily="34" charset="0"/>
+            </a:endParaRPr>
+          </a:p>
+          <a:p>
+            <a:pPr defTabSz="521208">
+              <a:spcBef>
+                <a:spcPts val="200"/>
+              </a:spcBef>
+              <a:defRPr sz="1254">
+                <a:solidFill>
+                  <a:schemeClr val="accent1"/>
+                </a:solidFill>
+              </a:defRPr>
+            </a:pPr>
+            <a:endParaRPr lang="en-US" sz="1200" dirty="0">
+              <a:solidFill>
+                <a:schemeClr val="tx1"/>
+              </a:solidFill>
+              <a:latin typeface="Calibri Light" panose="020F0302020204030204" pitchFamily="34" charset="0"/>
+              <a:cs typeface="Calibri Light" panose="020F0302020204030204" pitchFamily="34" charset="0"/>
+            </a:endParaRPr>
+          </a:p>
+          <a:p>
+            <a:pPr marL="0" marR="0" lvl="0" indent="0" algn="ctr" defTabSz="521208" rtl="0" eaLnBrk="1" fontAlgn="auto" latinLnBrk="0" hangingPunct="1">
+              <a:lnSpc>
+                <a:spcPct val="100000"/>
+              </a:lnSpc>
+              <a:spcBef>
+                <a:spcPts val="200"/>
+              </a:spcBef>
+              <a:spcAft>
+                <a:spcPts val="0"/>
+              </a:spcAft>
+              <a:buClrTx/>
+              <a:buSzTx/>
+              <a:buFontTx/>
+              <a:buNone/>
+              <a:tabLst/>
+              <a:defRPr sz="1254">
+                <a:solidFill>
+                  <a:srgbClr val="2D89CC"/>
+                </a:solidFill>
+              </a:defRPr>
+            </a:pPr>
+            <a:r>
+              <a:rPr kumimoji="0" lang="en-US" sz="1200" u="none" strike="noStrike" kern="0" cap="none" spc="0" normalizeH="0" baseline="0" noProof="0" dirty="0">
+                <a:ln>
+                  <a:noFill/>
+                </a:ln>
+                <a:solidFill>
+                  <a:srgbClr val="000000"/>
+                </a:solidFill>
+                <a:effectLst/>
+                <a:uLnTx/>
+                <a:uFillTx/>
+                <a:latin typeface="Calibri Light" panose="020F0302020204030204" pitchFamily="34" charset="0"/>
+                <a:cs typeface="Calibri Light" panose="020F0302020204030204" pitchFamily="34" charset="0"/>
+                <a:sym typeface="Calibri"/>
+              </a:rPr>
+              <a:t>Description of the 4</a:t>
+            </a:r>
+            <a:r>
+              <a:rPr kumimoji="0" lang="en-US" sz="1200" u="none" strike="noStrike" kern="0" cap="none" spc="0" normalizeH="0" baseline="30000" noProof="0" dirty="0">
+                <a:ln>
+                  <a:noFill/>
+                </a:ln>
+                <a:solidFill>
+                  <a:srgbClr val="000000"/>
+                </a:solidFill>
+                <a:effectLst/>
+                <a:uLnTx/>
+                <a:uFillTx/>
+                <a:latin typeface="Calibri Light" panose="020F0302020204030204" pitchFamily="34" charset="0"/>
+                <a:cs typeface="Calibri Light" panose="020F0302020204030204" pitchFamily="34" charset="0"/>
+                <a:sym typeface="Calibri"/>
+              </a:rPr>
+              <a:t>th</a:t>
+            </a:r>
+            <a:r>
+              <a:rPr kumimoji="0" lang="en-US" sz="1200" u="none" strike="noStrike" kern="0" cap="none" spc="0" normalizeH="0" baseline="0" noProof="0" dirty="0">
+                <a:ln>
+                  <a:noFill/>
+                </a:ln>
+                <a:solidFill>
+                  <a:srgbClr val="000000"/>
+                </a:solidFill>
+                <a:effectLst/>
+                <a:uLnTx/>
+                <a:uFillTx/>
+                <a:latin typeface="Calibri Light" panose="020F0302020204030204" pitchFamily="34" charset="0"/>
+                <a:cs typeface="Calibri Light" panose="020F0302020204030204" pitchFamily="34" charset="0"/>
+                <a:sym typeface="Calibri"/>
+              </a:rPr>
+              <a:t> stage</a:t>
+            </a:r>
+          </a:p>
+          <a:p>
             <a:pPr algn="just" defTabSz="521208">
               <a:spcBef>
                 <a:spcPts val="200"/>
@@ -8479,14 +8964,33 @@
               <a:cs typeface="Calibri Light" panose="020F0302020204030204" pitchFamily="34" charset="0"/>
             </a:endParaRPr>
           </a:p>
+          <a:p>
+            <a:pPr algn="just" defTabSz="521208">
+              <a:spcBef>
+                <a:spcPts val="200"/>
+              </a:spcBef>
+              <a:defRPr sz="1254">
+                <a:solidFill>
+                  <a:schemeClr val="accent1"/>
+                </a:solidFill>
+              </a:defRPr>
+            </a:pPr>
+            <a:endParaRPr lang="en-US" sz="1600" dirty="0">
+              <a:solidFill>
+                <a:schemeClr val="tx1"/>
+              </a:solidFill>
+              <a:latin typeface="Calibri Light" panose="020F0302020204030204" pitchFamily="34" charset="0"/>
+              <a:cs typeface="Calibri Light" panose="020F0302020204030204" pitchFamily="34" charset="0"/>
+            </a:endParaRPr>
+          </a:p>
         </p:txBody>
       </p:sp>
       <p:pic>
         <p:nvPicPr>
-          <p:cNvPr id="8" name="Picture 7" descr="Graphical user interface, text, application&#10;&#10;Description automatically generated">
+          <p:cNvPr id="7" name="Picture 6" descr="Diagram&#10;&#10;Description automatically generated">
             <a:extLst>
               <a:ext uri="{FF2B5EF4-FFF2-40B4-BE49-F238E27FC236}">
-                <a16:creationId xmlns:a16="http://schemas.microsoft.com/office/drawing/2014/main" id="{C54692E6-3688-929D-8D75-CBF5BE95099E}"/>
+                <a16:creationId xmlns:a16="http://schemas.microsoft.com/office/drawing/2014/main" id="{3A48E675-C9A8-6BA4-13D7-CBD12925FF49}"/>
               </a:ext>
             </a:extLst>
           </p:cNvPr>
@@ -8509,8 +9013,8 @@
         </p:blipFill>
         <p:spPr>
           <a:xfrm>
-            <a:off x="1642972" y="3645024"/>
-            <a:ext cx="5858055" cy="743880"/>
+            <a:off x="1587154" y="3356992"/>
+            <a:ext cx="5969691" cy="758056"/>
           </a:xfrm>
           <a:prstGeom prst="rect">
             <a:avLst/>
@@ -8527,11 +9031,11 @@
   <p:clrMapOvr>
     <a:masterClrMapping/>
   </p:clrMapOvr>
-  <mc:AlternateContent xmlns:mc="http://schemas.openxmlformats.org/markup-compatibility/2006">
-    <mc:Choice xmlns:p14="http://schemas.microsoft.com/office/powerpoint/2010/main" Requires="p14">
+  <mc:AlternateContent xmlns:mc="http://schemas.openxmlformats.org/markup-compatibility/2006" xmlns:p14="http://schemas.microsoft.com/office/powerpoint/2010/main">
+    <mc:Choice Requires="p14">
       <p:transition p14:dur="0"/>
     </mc:Choice>
-    <mc:Fallback>
+    <mc:Fallback xmlns="">
       <p:transition/>
     </mc:Fallback>
   </mc:AlternateContent>
@@ -8580,7 +9084,7 @@
           </a:ln>
           <a:extLst>
             <a:ext uri="{C572A759-6A51-4108-AA02-DFA0A04FC94B}">
-              <ma14:wrappingTextBoxFlag xmlns:ma14="http://schemas.microsoft.com/office/mac/drawingml/2011/main" xmlns:a14="http://schemas.microsoft.com/office/drawing/2010/main" xmlns:m="http://schemas.openxmlformats.org/officeDocument/2006/math" xmlns="" val="1"/>
+              <ma14:wrappingTextBoxFlag xmlns="" xmlns:m="http://schemas.openxmlformats.org/officeDocument/2006/math" xmlns:a14="http://schemas.microsoft.com/office/drawing/2010/main" xmlns:ma14="http://schemas.microsoft.com/office/mac/drawingml/2011/main" val="1"/>
             </a:ext>
           </a:extLst>
         </p:spPr>
@@ -8982,7 +9486,7 @@
           </a:ln>
           <a:extLst>
             <a:ext uri="{C572A759-6A51-4108-AA02-DFA0A04FC94B}">
-              <ma14:wrappingTextBoxFlag xmlns:ma14="http://schemas.microsoft.com/office/mac/drawingml/2011/main" xmlns:a14="http://schemas.microsoft.com/office/drawing/2010/main" xmlns:m="http://schemas.openxmlformats.org/officeDocument/2006/math" xmlns="" val="1"/>
+              <ma14:wrappingTextBoxFlag xmlns="" xmlns:m="http://schemas.openxmlformats.org/officeDocument/2006/math" xmlns:a14="http://schemas.microsoft.com/office/drawing/2010/main" xmlns:ma14="http://schemas.microsoft.com/office/mac/drawingml/2011/main" val="1"/>
             </a:ext>
           </a:extLst>
         </p:spPr>
@@ -9037,7 +9541,7 @@
           </a:ln>
           <a:extLst>
             <a:ext uri="{C572A759-6A51-4108-AA02-DFA0A04FC94B}">
-              <ma14:wrappingTextBoxFlag xmlns:ma14="http://schemas.microsoft.com/office/mac/drawingml/2011/main" xmlns:a14="http://schemas.microsoft.com/office/drawing/2010/main" xmlns:m="http://schemas.openxmlformats.org/officeDocument/2006/math" xmlns="" val="1"/>
+              <ma14:wrappingTextBoxFlag xmlns="" xmlns:m="http://schemas.openxmlformats.org/officeDocument/2006/math" xmlns:a14="http://schemas.microsoft.com/office/drawing/2010/main" xmlns:ma14="http://schemas.microsoft.com/office/mac/drawingml/2011/main" val="1"/>
             </a:ext>
           </a:extLst>
         </p:spPr>
@@ -9088,7 +9592,7 @@
           </a:ln>
           <a:extLst>
             <a:ext uri="{C572A759-6A51-4108-AA02-DFA0A04FC94B}">
-              <ma14:wrappingTextBoxFlag xmlns:ma14="http://schemas.microsoft.com/office/mac/drawingml/2011/main" xmlns:a14="http://schemas.microsoft.com/office/drawing/2010/main" xmlns:m="http://schemas.openxmlformats.org/officeDocument/2006/math" xmlns="" val="1"/>
+              <ma14:wrappingTextBoxFlag xmlns="" xmlns:m="http://schemas.openxmlformats.org/officeDocument/2006/math" xmlns:a14="http://schemas.microsoft.com/office/drawing/2010/main" xmlns:ma14="http://schemas.microsoft.com/office/mac/drawingml/2011/main" val="1"/>
             </a:ext>
           </a:extLst>
         </p:spPr>
@@ -9177,14 +9681,14 @@
           <p:nvPr>
             <p:extLst>
               <p:ext uri="{D42A27DB-BD31-4B8C-83A1-F6EECF244321}">
-                <p14:modId xmlns:p14="http://schemas.microsoft.com/office/powerpoint/2010/main" val="3899533588"/>
+                <p14:modId xmlns:p14="http://schemas.microsoft.com/office/powerpoint/2010/main" val="810957695"/>
               </p:ext>
             </p:extLst>
           </p:nvPr>
         </p:nvGraphicFramePr>
         <p:xfrm>
           <a:off x="682077" y="1844824"/>
-          <a:ext cx="7848873" cy="2225040"/>
+          <a:ext cx="7848873" cy="2595880"/>
         </p:xfrm>
         <a:graphic>
           <a:graphicData uri="http://schemas.openxmlformats.org/drawingml/2006/table">
@@ -9902,21 +10406,7 @@
                           <a:latin typeface="Calibri Light" panose="020F0302020204030204" pitchFamily="34" charset="0"/>
                           <a:cs typeface="Calibri Light" panose="020F0302020204030204" pitchFamily="34" charset="0"/>
                         </a:rPr>
-                        <a:t>About explosion(author of neural </a:t>
-                      </a:r>
-                      <a:r>
-                        <a:rPr lang="en-US" sz="1600" b="0" i="0" dirty="0" err="1">
-                          <a:latin typeface="Calibri Light" panose="020F0302020204030204" pitchFamily="34" charset="0"/>
-                          <a:cs typeface="Calibri Light" panose="020F0302020204030204" pitchFamily="34" charset="0"/>
-                        </a:rPr>
-                        <a:t>coref</a:t>
-                      </a:r>
-                      <a:r>
-                        <a:rPr lang="en-US" sz="1600" b="0" i="0" dirty="0">
-                          <a:latin typeface="Calibri Light" panose="020F0302020204030204" pitchFamily="34" charset="0"/>
-                          <a:cs typeface="Calibri Light" panose="020F0302020204030204" pitchFamily="34" charset="0"/>
-                        </a:rPr>
-                        <a:t> transformer model)</a:t>
+                        <a:t>BERT ReadMe</a:t>
                       </a:r>
                     </a:p>
                   </a:txBody>
@@ -10033,6 +10523,211 @@
                 </a:tc>
                 <a:extLst>
                   <a:ext uri="{0D108BD9-81ED-4DB2-BD59-A6C34878D82A}">
+                    <a16:rowId xmlns:a16="http://schemas.microsoft.com/office/drawing/2014/main" val="2863666942"/>
+                  </a:ext>
+                </a:extLst>
+              </a:tr>
+              <a:tr h="370840">
+                <a:tc>
+                  <a:txBody>
+                    <a:bodyPr/>
+                    <a:lstStyle/>
+                    <a:p>
+                      <a:r>
+                        <a:rPr lang="en-US" sz="1600" b="0" i="0" dirty="0">
+                          <a:latin typeface="Calibri Light" panose="020F0302020204030204" pitchFamily="34" charset="0"/>
+                          <a:cs typeface="Calibri Light" panose="020F0302020204030204" pitchFamily="34" charset="0"/>
+                        </a:rPr>
+                        <a:t>4</a:t>
+                      </a:r>
+                    </a:p>
+                  </a:txBody>
+                  <a:tcPr>
+                    <a:lnL w="12700" cap="flat" cmpd="sng" algn="ctr">
+                      <a:noFill/>
+                      <a:prstDash val="solid"/>
+                      <a:round/>
+                      <a:headEnd type="none" w="med" len="med"/>
+                      <a:tailEnd type="none" w="med" len="med"/>
+                    </a:lnL>
+                    <a:lnR w="12700" cap="flat" cmpd="sng" algn="ctr">
+                      <a:solidFill>
+                        <a:schemeClr val="tx1"/>
+                      </a:solidFill>
+                      <a:prstDash val="solid"/>
+                      <a:round/>
+                      <a:headEnd type="none" w="med" len="med"/>
+                      <a:tailEnd type="none" w="med" len="med"/>
+                    </a:lnR>
+                    <a:lnT w="12700" cap="flat" cmpd="sng" algn="ctr">
+                      <a:solidFill>
+                        <a:schemeClr val="tx1"/>
+                      </a:solidFill>
+                      <a:prstDash val="solid"/>
+                      <a:round/>
+                      <a:headEnd type="none" w="med" len="med"/>
+                      <a:tailEnd type="none" w="med" len="med"/>
+                    </a:lnT>
+                    <a:lnB w="12700" cap="flat" cmpd="sng" algn="ctr">
+                      <a:solidFill>
+                        <a:schemeClr val="tx1"/>
+                      </a:solidFill>
+                      <a:prstDash val="solid"/>
+                      <a:round/>
+                      <a:headEnd type="none" w="med" len="med"/>
+                      <a:tailEnd type="none" w="med" len="med"/>
+                    </a:lnB>
+                    <a:lnTlToBr w="12700" cmpd="sng">
+                      <a:noFill/>
+                      <a:prstDash val="solid"/>
+                    </a:lnTlToBr>
+                    <a:lnBlToTr w="12700" cmpd="sng">
+                      <a:noFill/>
+                      <a:prstDash val="solid"/>
+                    </a:lnBlToTr>
+                  </a:tcPr>
+                </a:tc>
+                <a:tc>
+                  <a:txBody>
+                    <a:bodyPr/>
+                    <a:lstStyle/>
+                    <a:p>
+                      <a:r>
+                        <a:rPr lang="en-US" sz="1600" b="0" i="0" dirty="0">
+                          <a:latin typeface="Calibri Light" panose="020F0302020204030204" pitchFamily="34" charset="0"/>
+                          <a:cs typeface="Calibri Light" panose="020F0302020204030204" pitchFamily="34" charset="0"/>
+                        </a:rPr>
+                        <a:t>About explosion(author of neural </a:t>
+                      </a:r>
+                      <a:r>
+                        <a:rPr lang="en-US" sz="1600" b="0" i="0" dirty="0" err="1">
+                          <a:latin typeface="Calibri Light" panose="020F0302020204030204" pitchFamily="34" charset="0"/>
+                          <a:cs typeface="Calibri Light" panose="020F0302020204030204" pitchFamily="34" charset="0"/>
+                        </a:rPr>
+                        <a:t>coref</a:t>
+                      </a:r>
+                      <a:r>
+                        <a:rPr lang="en-US" sz="1600" b="0" i="0" dirty="0">
+                          <a:latin typeface="Calibri Light" panose="020F0302020204030204" pitchFamily="34" charset="0"/>
+                          <a:cs typeface="Calibri Light" panose="020F0302020204030204" pitchFamily="34" charset="0"/>
+                        </a:rPr>
+                        <a:t> transformer model)</a:t>
+                      </a:r>
+                    </a:p>
+                  </a:txBody>
+                  <a:tcPr>
+                    <a:lnL w="12700" cap="flat" cmpd="sng" algn="ctr">
+                      <a:solidFill>
+                        <a:schemeClr val="tx1"/>
+                      </a:solidFill>
+                      <a:prstDash val="solid"/>
+                      <a:round/>
+                      <a:headEnd type="none" w="med" len="med"/>
+                      <a:tailEnd type="none" w="med" len="med"/>
+                    </a:lnL>
+                    <a:lnR w="12700" cap="flat" cmpd="sng" algn="ctr">
+                      <a:solidFill>
+                        <a:schemeClr val="tx1"/>
+                      </a:solidFill>
+                      <a:prstDash val="solid"/>
+                      <a:round/>
+                      <a:headEnd type="none" w="med" len="med"/>
+                      <a:tailEnd type="none" w="med" len="med"/>
+                    </a:lnR>
+                    <a:lnT w="12700" cap="flat" cmpd="sng" algn="ctr">
+                      <a:solidFill>
+                        <a:schemeClr val="tx1"/>
+                      </a:solidFill>
+                      <a:prstDash val="solid"/>
+                      <a:round/>
+                      <a:headEnd type="none" w="med" len="med"/>
+                      <a:tailEnd type="none" w="med" len="med"/>
+                    </a:lnT>
+                    <a:lnB w="12700" cap="flat" cmpd="sng" algn="ctr">
+                      <a:solidFill>
+                        <a:schemeClr val="tx1"/>
+                      </a:solidFill>
+                      <a:prstDash val="solid"/>
+                      <a:round/>
+                      <a:headEnd type="none" w="med" len="med"/>
+                      <a:tailEnd type="none" w="med" len="med"/>
+                    </a:lnB>
+                    <a:lnTlToBr w="12700" cmpd="sng">
+                      <a:noFill/>
+                      <a:prstDash val="solid"/>
+                    </a:lnTlToBr>
+                    <a:lnBlToTr w="12700" cmpd="sng">
+                      <a:noFill/>
+                      <a:prstDash val="solid"/>
+                    </a:lnBlToTr>
+                  </a:tcPr>
+                </a:tc>
+                <a:tc>
+                  <a:txBody>
+                    <a:bodyPr/>
+                    <a:lstStyle/>
+                    <a:p>
+                      <a:r>
+                        <a:rPr lang="en-US" sz="1600" b="0" i="0" dirty="0">
+                          <a:latin typeface="Calibri Light" panose="020F0302020204030204" pitchFamily="34" charset="0"/>
+                          <a:cs typeface="Calibri Light" panose="020F0302020204030204" pitchFamily="34" charset="0"/>
+                          <a:hlinkClick r:id="rId5"/>
+                        </a:rPr>
+                        <a:t>link</a:t>
+                      </a:r>
+                      <a:endParaRPr lang="en-US" sz="1600" b="0" i="0" dirty="0">
+                        <a:latin typeface="Calibri Light" panose="020F0302020204030204" pitchFamily="34" charset="0"/>
+                        <a:cs typeface="Calibri Light" panose="020F0302020204030204" pitchFamily="34" charset="0"/>
+                      </a:endParaRPr>
+                    </a:p>
+                  </a:txBody>
+                  <a:tcPr>
+                    <a:lnL w="12700" cap="flat" cmpd="sng" algn="ctr">
+                      <a:solidFill>
+                        <a:schemeClr val="tx1"/>
+                      </a:solidFill>
+                      <a:prstDash val="solid"/>
+                      <a:round/>
+                      <a:headEnd type="none" w="med" len="med"/>
+                      <a:tailEnd type="none" w="med" len="med"/>
+                    </a:lnL>
+                    <a:lnR w="12700" cap="flat" cmpd="sng" algn="ctr">
+                      <a:noFill/>
+                      <a:prstDash val="solid"/>
+                      <a:round/>
+                      <a:headEnd type="none" w="med" len="med"/>
+                      <a:tailEnd type="none" w="med" len="med"/>
+                    </a:lnR>
+                    <a:lnT w="12700" cap="flat" cmpd="sng" algn="ctr">
+                      <a:solidFill>
+                        <a:schemeClr val="tx1"/>
+                      </a:solidFill>
+                      <a:prstDash val="solid"/>
+                      <a:round/>
+                      <a:headEnd type="none" w="med" len="med"/>
+                      <a:tailEnd type="none" w="med" len="med"/>
+                    </a:lnT>
+                    <a:lnB w="12700" cap="flat" cmpd="sng" algn="ctr">
+                      <a:solidFill>
+                        <a:schemeClr val="tx1"/>
+                      </a:solidFill>
+                      <a:prstDash val="solid"/>
+                      <a:round/>
+                      <a:headEnd type="none" w="med" len="med"/>
+                      <a:tailEnd type="none" w="med" len="med"/>
+                    </a:lnB>
+                    <a:lnTlToBr w="12700" cmpd="sng">
+                      <a:noFill/>
+                      <a:prstDash val="solid"/>
+                    </a:lnTlToBr>
+                    <a:lnBlToTr w="12700" cmpd="sng">
+                      <a:noFill/>
+                      <a:prstDash val="solid"/>
+                    </a:lnBlToTr>
+                  </a:tcPr>
+                </a:tc>
+                <a:extLst>
+                  <a:ext uri="{0D108BD9-81ED-4DB2-BD59-A6C34878D82A}">
                     <a16:rowId xmlns:a16="http://schemas.microsoft.com/office/drawing/2014/main" val="3941946998"/>
                   </a:ext>
                 </a:extLst>
@@ -10048,7 +10743,7 @@
                           <a:latin typeface="Calibri Light" panose="020F0302020204030204" pitchFamily="34" charset="0"/>
                           <a:cs typeface="Calibri Light" panose="020F0302020204030204" pitchFamily="34" charset="0"/>
                         </a:rPr>
-                        <a:t>4</a:t>
+                        <a:t>5</a:t>
                       </a:r>
                     </a:p>
                   </a:txBody>
@@ -10167,7 +10862,7 @@
                         <a:rPr lang="en-US" sz="1600" b="0" i="0" dirty="0">
                           <a:latin typeface="Calibri Light" panose="020F0302020204030204" pitchFamily="34" charset="0"/>
                           <a:cs typeface="Calibri Light" panose="020F0302020204030204" pitchFamily="34" charset="0"/>
-                          <a:hlinkClick r:id="rId5"/>
+                          <a:hlinkClick r:id="rId6"/>
                         </a:rPr>
                         <a:t>link</a:t>
                       </a:r>

</xml_diff>

<commit_message>
dropped extra files and updated documentation
</commit_message>
<xml_diff>
--- a/documentation/Presentation.pptx
+++ b/documentation/Presentation.pptx
@@ -1054,7 +1054,7 @@
           </a:ln>
           <a:extLst>
             <a:ext uri="{C572A759-6A51-4108-AA02-DFA0A04FC94B}">
-              <ma14:wrappingTextBoxFlag xmlns="" xmlns:m="http://schemas.openxmlformats.org/officeDocument/2006/math" xmlns:a14="http://schemas.microsoft.com/office/drawing/2010/main" xmlns:ma14="http://schemas.microsoft.com/office/mac/drawingml/2011/main" val="1"/>
+              <ma14:wrappingTextBoxFlag xmlns:ma14="http://schemas.microsoft.com/office/mac/drawingml/2011/main" xmlns:a14="http://schemas.microsoft.com/office/drawing/2010/main" xmlns:m="http://schemas.openxmlformats.org/officeDocument/2006/math" xmlns="" val="1"/>
             </a:ext>
           </a:extLst>
         </p:spPr>
@@ -4575,7 +4575,7 @@
           </a:ln>
           <a:extLst>
             <a:ext uri="{C572A759-6A51-4108-AA02-DFA0A04FC94B}">
-              <ma14:wrappingTextBoxFlag xmlns="" xmlns:m="http://schemas.openxmlformats.org/officeDocument/2006/math" xmlns:a14="http://schemas.microsoft.com/office/drawing/2010/main" xmlns:ma14="http://schemas.microsoft.com/office/mac/drawingml/2011/main" val="1"/>
+              <ma14:wrappingTextBoxFlag xmlns:ma14="http://schemas.microsoft.com/office/mac/drawingml/2011/main" xmlns:a14="http://schemas.microsoft.com/office/drawing/2010/main" xmlns:m="http://schemas.openxmlformats.org/officeDocument/2006/math" xmlns="" val="1"/>
             </a:ext>
           </a:extLst>
         </p:spPr>
@@ -4614,7 +4614,7 @@
           </a:ln>
           <a:extLst>
             <a:ext uri="{C572A759-6A51-4108-AA02-DFA0A04FC94B}">
-              <ma14:wrappingTextBoxFlag xmlns="" xmlns:m="http://schemas.openxmlformats.org/officeDocument/2006/math" xmlns:a14="http://schemas.microsoft.com/office/drawing/2010/main" xmlns:ma14="http://schemas.microsoft.com/office/mac/drawingml/2011/main" val="1"/>
+              <ma14:wrappingTextBoxFlag xmlns:ma14="http://schemas.microsoft.com/office/mac/drawingml/2011/main" xmlns:a14="http://schemas.microsoft.com/office/drawing/2010/main" xmlns:m="http://schemas.openxmlformats.org/officeDocument/2006/math" xmlns="" val="1"/>
             </a:ext>
           </a:extLst>
         </p:spPr>
@@ -5560,7 +5560,7 @@
               <a:t>February 16</a:t>
             </a:r>
             <a:r>
-              <a:rPr lang="de-DE" sz="1400" dirty="0" err="1">
+              <a:rPr lang="de-DE" sz="1400" baseline="30000" dirty="0">
                 <a:latin typeface="Arial" pitchFamily="34" charset="0"/>
                 <a:cs typeface="Arial" pitchFamily="34" charset="0"/>
               </a:rPr>
@@ -5670,7 +5670,7 @@
           </a:ln>
           <a:extLst>
             <a:ext uri="{C572A759-6A51-4108-AA02-DFA0A04FC94B}">
-              <ma14:wrappingTextBoxFlag xmlns="" xmlns:m="http://schemas.openxmlformats.org/officeDocument/2006/math" xmlns:a14="http://schemas.microsoft.com/office/drawing/2010/main" xmlns:ma14="http://schemas.microsoft.com/office/mac/drawingml/2011/main" val="1"/>
+              <ma14:wrappingTextBoxFlag xmlns:ma14="http://schemas.microsoft.com/office/mac/drawingml/2011/main" xmlns:a14="http://schemas.microsoft.com/office/drawing/2010/main" xmlns:m="http://schemas.openxmlformats.org/officeDocument/2006/math" xmlns="" val="1"/>
             </a:ext>
           </a:extLst>
         </p:spPr>
@@ -5983,7 +5983,7 @@
           </a:ln>
           <a:extLst>
             <a:ext uri="{C572A759-6A51-4108-AA02-DFA0A04FC94B}">
-              <ma14:wrappingTextBoxFlag xmlns:ma14="http://schemas.microsoft.com/office/mac/drawingml/2011/main" xmlns:a14="http://schemas.microsoft.com/office/drawing/2010/main" xmlns:m="http://schemas.openxmlformats.org/officeDocument/2006/math" xmlns="" val="1"/>
+              <ma14:wrappingTextBoxFlag xmlns="" xmlns:m="http://schemas.openxmlformats.org/officeDocument/2006/math" xmlns:a14="http://schemas.microsoft.com/office/drawing/2010/main" xmlns:ma14="http://schemas.microsoft.com/office/mac/drawingml/2011/main" val="1"/>
             </a:ext>
           </a:extLst>
         </p:spPr>
@@ -6323,7 +6323,7 @@
           </a:ln>
           <a:extLst>
             <a:ext uri="{C572A759-6A51-4108-AA02-DFA0A04FC94B}">
-              <ma14:wrappingTextBoxFlag xmlns="" xmlns:m="http://schemas.openxmlformats.org/officeDocument/2006/math" xmlns:a14="http://schemas.microsoft.com/office/drawing/2010/main" xmlns:ma14="http://schemas.microsoft.com/office/mac/drawingml/2011/main" val="1"/>
+              <ma14:wrappingTextBoxFlag xmlns:ma14="http://schemas.microsoft.com/office/mac/drawingml/2011/main" xmlns:a14="http://schemas.microsoft.com/office/drawing/2010/main" xmlns:m="http://schemas.openxmlformats.org/officeDocument/2006/math" xmlns="" val="1"/>
             </a:ext>
           </a:extLst>
         </p:spPr>
@@ -6384,7 +6384,7 @@
           </a:ln>
           <a:extLst>
             <a:ext uri="{C572A759-6A51-4108-AA02-DFA0A04FC94B}">
-              <ma14:wrappingTextBoxFlag xmlns="" xmlns:m="http://schemas.openxmlformats.org/officeDocument/2006/math" xmlns:a14="http://schemas.microsoft.com/office/drawing/2010/main" xmlns:ma14="http://schemas.microsoft.com/office/mac/drawingml/2011/main" val="1"/>
+              <ma14:wrappingTextBoxFlag xmlns:ma14="http://schemas.microsoft.com/office/mac/drawingml/2011/main" xmlns:a14="http://schemas.microsoft.com/office/drawing/2010/main" xmlns:m="http://schemas.openxmlformats.org/officeDocument/2006/math" xmlns="" val="1"/>
             </a:ext>
           </a:extLst>
         </p:spPr>
@@ -6435,7 +6435,7 @@
           </a:ln>
           <a:extLst>
             <a:ext uri="{C572A759-6A51-4108-AA02-DFA0A04FC94B}">
-              <ma14:wrappingTextBoxFlag xmlns="" xmlns:m="http://schemas.openxmlformats.org/officeDocument/2006/math" xmlns:a14="http://schemas.microsoft.com/office/drawing/2010/main" xmlns:ma14="http://schemas.microsoft.com/office/mac/drawingml/2011/main" val="1"/>
+              <ma14:wrappingTextBoxFlag xmlns:ma14="http://schemas.microsoft.com/office/mac/drawingml/2011/main" xmlns:a14="http://schemas.microsoft.com/office/drawing/2010/main" xmlns:m="http://schemas.openxmlformats.org/officeDocument/2006/math" xmlns="" val="1"/>
             </a:ext>
           </a:extLst>
         </p:spPr>
@@ -7199,7 +7199,7 @@
           </a:ln>
           <a:extLst>
             <a:ext uri="{C572A759-6A51-4108-AA02-DFA0A04FC94B}">
-              <ma14:wrappingTextBoxFlag xmlns:ma14="http://schemas.microsoft.com/office/mac/drawingml/2011/main" xmlns:a14="http://schemas.microsoft.com/office/drawing/2010/main" xmlns:m="http://schemas.openxmlformats.org/officeDocument/2006/math" xmlns="" val="1"/>
+              <ma14:wrappingTextBoxFlag xmlns="" xmlns:m="http://schemas.openxmlformats.org/officeDocument/2006/math" xmlns:a14="http://schemas.microsoft.com/office/drawing/2010/main" xmlns:ma14="http://schemas.microsoft.com/office/mac/drawingml/2011/main" val="1"/>
             </a:ext>
           </a:extLst>
         </p:spPr>
@@ -7254,7 +7254,7 @@
           </a:ln>
           <a:extLst>
             <a:ext uri="{C572A759-6A51-4108-AA02-DFA0A04FC94B}">
-              <ma14:wrappingTextBoxFlag xmlns:ma14="http://schemas.microsoft.com/office/mac/drawingml/2011/main" xmlns:a14="http://schemas.microsoft.com/office/drawing/2010/main" xmlns:m="http://schemas.openxmlformats.org/officeDocument/2006/math" xmlns="" val="1"/>
+              <ma14:wrappingTextBoxFlag xmlns="" xmlns:m="http://schemas.openxmlformats.org/officeDocument/2006/math" xmlns:a14="http://schemas.microsoft.com/office/drawing/2010/main" xmlns:ma14="http://schemas.microsoft.com/office/mac/drawingml/2011/main" val="1"/>
             </a:ext>
           </a:extLst>
         </p:spPr>
@@ -7305,7 +7305,7 @@
           </a:ln>
           <a:extLst>
             <a:ext uri="{C572A759-6A51-4108-AA02-DFA0A04FC94B}">
-              <ma14:wrappingTextBoxFlag xmlns:ma14="http://schemas.microsoft.com/office/mac/drawingml/2011/main" xmlns:a14="http://schemas.microsoft.com/office/drawing/2010/main" xmlns:m="http://schemas.openxmlformats.org/officeDocument/2006/math" xmlns="" val="1"/>
+              <ma14:wrappingTextBoxFlag xmlns="" xmlns:m="http://schemas.openxmlformats.org/officeDocument/2006/math" xmlns:a14="http://schemas.microsoft.com/office/drawing/2010/main" xmlns:ma14="http://schemas.microsoft.com/office/mac/drawingml/2011/main" val="1"/>
             </a:ext>
           </a:extLst>
         </p:spPr>
@@ -7751,7 +7751,7 @@
           </a:ln>
           <a:extLst>
             <a:ext uri="{C572A759-6A51-4108-AA02-DFA0A04FC94B}">
-              <ma14:wrappingTextBoxFlag xmlns="" xmlns:m="http://schemas.openxmlformats.org/officeDocument/2006/math" xmlns:a14="http://schemas.microsoft.com/office/drawing/2010/main" xmlns:ma14="http://schemas.microsoft.com/office/mac/drawingml/2011/main" val="1"/>
+              <ma14:wrappingTextBoxFlag xmlns:ma14="http://schemas.microsoft.com/office/mac/drawingml/2011/main" xmlns:a14="http://schemas.microsoft.com/office/drawing/2010/main" xmlns:m="http://schemas.openxmlformats.org/officeDocument/2006/math" xmlns="" val="1"/>
             </a:ext>
           </a:extLst>
         </p:spPr>
@@ -8186,7 +8186,7 @@
           </a:ln>
           <a:extLst>
             <a:ext uri="{C572A759-6A51-4108-AA02-DFA0A04FC94B}">
-              <ma14:wrappingTextBoxFlag xmlns:ma14="http://schemas.microsoft.com/office/mac/drawingml/2011/main" xmlns:a14="http://schemas.microsoft.com/office/drawing/2010/main" xmlns:m="http://schemas.openxmlformats.org/officeDocument/2006/math" xmlns="" val="1"/>
+              <ma14:wrappingTextBoxFlag xmlns="" xmlns:m="http://schemas.openxmlformats.org/officeDocument/2006/math" xmlns:a14="http://schemas.microsoft.com/office/drawing/2010/main" xmlns:ma14="http://schemas.microsoft.com/office/mac/drawingml/2011/main" val="1"/>
             </a:ext>
           </a:extLst>
         </p:spPr>
@@ -8603,7 +8603,7 @@
           </a:ln>
           <a:extLst>
             <a:ext uri="{C572A759-6A51-4108-AA02-DFA0A04FC94B}">
-              <ma14:wrappingTextBoxFlag xmlns="" xmlns:m="http://schemas.openxmlformats.org/officeDocument/2006/math" xmlns:a14="http://schemas.microsoft.com/office/drawing/2010/main" xmlns:ma14="http://schemas.microsoft.com/office/mac/drawingml/2011/main" val="1"/>
+              <ma14:wrappingTextBoxFlag xmlns:ma14="http://schemas.microsoft.com/office/mac/drawingml/2011/main" xmlns:a14="http://schemas.microsoft.com/office/drawing/2010/main" xmlns:m="http://schemas.openxmlformats.org/officeDocument/2006/math" xmlns="" val="1"/>
             </a:ext>
           </a:extLst>
         </p:spPr>
@@ -8716,7 +8716,7 @@
                 <a:latin typeface="Calibri Light" panose="020F0302020204030204" pitchFamily="34" charset="0"/>
                 <a:cs typeface="Calibri Light" panose="020F0302020204030204" pitchFamily="34" charset="0"/>
               </a:rPr>
-              <a:t>-base-uncased’ was used as the base classifier model, it was then trained on ~3500 annotated samples to classify goals from action statements. The Fine-tuning process adds 12 additional hidden layers on top of pre-trained BERT layers.</a:t>
+              <a:t>-base-uncased’ was used as the base classifier model, it was then trained on about 3.5k annotated samples to classify goals from action statements. The Fine-tuning process adds 12 additional hidden layers on top of pre-trained BERT layers.</a:t>
             </a:r>
           </a:p>
           <a:p>
@@ -9084,7 +9084,7 @@
           </a:ln>
           <a:extLst>
             <a:ext uri="{C572A759-6A51-4108-AA02-DFA0A04FC94B}">
-              <ma14:wrappingTextBoxFlag xmlns="" xmlns:m="http://schemas.openxmlformats.org/officeDocument/2006/math" xmlns:a14="http://schemas.microsoft.com/office/drawing/2010/main" xmlns:ma14="http://schemas.microsoft.com/office/mac/drawingml/2011/main" val="1"/>
+              <ma14:wrappingTextBoxFlag xmlns:ma14="http://schemas.microsoft.com/office/mac/drawingml/2011/main" xmlns:a14="http://schemas.microsoft.com/office/drawing/2010/main" xmlns:m="http://schemas.openxmlformats.org/officeDocument/2006/math" xmlns="" val="1"/>
             </a:ext>
           </a:extLst>
         </p:spPr>
@@ -9486,7 +9486,7 @@
           </a:ln>
           <a:extLst>
             <a:ext uri="{C572A759-6A51-4108-AA02-DFA0A04FC94B}">
-              <ma14:wrappingTextBoxFlag xmlns="" xmlns:m="http://schemas.openxmlformats.org/officeDocument/2006/math" xmlns:a14="http://schemas.microsoft.com/office/drawing/2010/main" xmlns:ma14="http://schemas.microsoft.com/office/mac/drawingml/2011/main" val="1"/>
+              <ma14:wrappingTextBoxFlag xmlns:ma14="http://schemas.microsoft.com/office/mac/drawingml/2011/main" xmlns:a14="http://schemas.microsoft.com/office/drawing/2010/main" xmlns:m="http://schemas.openxmlformats.org/officeDocument/2006/math" xmlns="" val="1"/>
             </a:ext>
           </a:extLst>
         </p:spPr>
@@ -9541,7 +9541,7 @@
           </a:ln>
           <a:extLst>
             <a:ext uri="{C572A759-6A51-4108-AA02-DFA0A04FC94B}">
-              <ma14:wrappingTextBoxFlag xmlns="" xmlns:m="http://schemas.openxmlformats.org/officeDocument/2006/math" xmlns:a14="http://schemas.microsoft.com/office/drawing/2010/main" xmlns:ma14="http://schemas.microsoft.com/office/mac/drawingml/2011/main" val="1"/>
+              <ma14:wrappingTextBoxFlag xmlns:ma14="http://schemas.microsoft.com/office/mac/drawingml/2011/main" xmlns:a14="http://schemas.microsoft.com/office/drawing/2010/main" xmlns:m="http://schemas.openxmlformats.org/officeDocument/2006/math" xmlns="" val="1"/>
             </a:ext>
           </a:extLst>
         </p:spPr>
@@ -9592,7 +9592,7 @@
           </a:ln>
           <a:extLst>
             <a:ext uri="{C572A759-6A51-4108-AA02-DFA0A04FC94B}">
-              <ma14:wrappingTextBoxFlag xmlns="" xmlns:m="http://schemas.openxmlformats.org/officeDocument/2006/math" xmlns:a14="http://schemas.microsoft.com/office/drawing/2010/main" xmlns:ma14="http://schemas.microsoft.com/office/mac/drawingml/2011/main" val="1"/>
+              <ma14:wrappingTextBoxFlag xmlns:ma14="http://schemas.microsoft.com/office/mac/drawingml/2011/main" xmlns:a14="http://schemas.microsoft.com/office/drawing/2010/main" xmlns:m="http://schemas.openxmlformats.org/officeDocument/2006/math" xmlns="" val="1"/>
             </a:ext>
           </a:extLst>
         </p:spPr>

</xml_diff>

<commit_message>
packaged goal extraction pipeline
</commit_message>
<xml_diff>
--- a/documentation/Presentation.pptx
+++ b/documentation/Presentation.pptx
@@ -1054,7 +1054,7 @@
           </a:ln>
           <a:extLst>
             <a:ext uri="{C572A759-6A51-4108-AA02-DFA0A04FC94B}">
-              <ma14:wrappingTextBoxFlag xmlns="" xmlns:m="http://schemas.openxmlformats.org/officeDocument/2006/math" xmlns:a14="http://schemas.microsoft.com/office/drawing/2010/main" xmlns:ma14="http://schemas.microsoft.com/office/mac/drawingml/2011/main" val="1"/>
+              <ma14:wrappingTextBoxFlag xmlns:ma14="http://schemas.microsoft.com/office/mac/drawingml/2011/main" xmlns:a14="http://schemas.microsoft.com/office/drawing/2010/main" xmlns:m="http://schemas.openxmlformats.org/officeDocument/2006/math" xmlns="" val="1"/>
             </a:ext>
           </a:extLst>
         </p:spPr>
@@ -4575,7 +4575,7 @@
           </a:ln>
           <a:extLst>
             <a:ext uri="{C572A759-6A51-4108-AA02-DFA0A04FC94B}">
-              <ma14:wrappingTextBoxFlag xmlns="" xmlns:m="http://schemas.openxmlformats.org/officeDocument/2006/math" xmlns:a14="http://schemas.microsoft.com/office/drawing/2010/main" xmlns:ma14="http://schemas.microsoft.com/office/mac/drawingml/2011/main" val="1"/>
+              <ma14:wrappingTextBoxFlag xmlns:ma14="http://schemas.microsoft.com/office/mac/drawingml/2011/main" xmlns:a14="http://schemas.microsoft.com/office/drawing/2010/main" xmlns:m="http://schemas.openxmlformats.org/officeDocument/2006/math" xmlns="" val="1"/>
             </a:ext>
           </a:extLst>
         </p:spPr>
@@ -4614,7 +4614,7 @@
           </a:ln>
           <a:extLst>
             <a:ext uri="{C572A759-6A51-4108-AA02-DFA0A04FC94B}">
-              <ma14:wrappingTextBoxFlag xmlns="" xmlns:m="http://schemas.openxmlformats.org/officeDocument/2006/math" xmlns:a14="http://schemas.microsoft.com/office/drawing/2010/main" xmlns:ma14="http://schemas.microsoft.com/office/mac/drawingml/2011/main" val="1"/>
+              <ma14:wrappingTextBoxFlag xmlns:ma14="http://schemas.microsoft.com/office/mac/drawingml/2011/main" xmlns:a14="http://schemas.microsoft.com/office/drawing/2010/main" xmlns:m="http://schemas.openxmlformats.org/officeDocument/2006/math" xmlns="" val="1"/>
             </a:ext>
           </a:extLst>
         </p:spPr>
@@ -5538,8 +5538,8 @@
         </p:nvSpPr>
         <p:spPr>
           <a:xfrm>
-            <a:off x="7006863" y="6093296"/>
-            <a:ext cx="1843774" cy="307777"/>
+            <a:off x="7470131" y="6093296"/>
+            <a:ext cx="1380506" cy="276999"/>
           </a:xfrm>
           <a:prstGeom prst="rect">
             <a:avLst/>
@@ -5553,21 +5553,21 @@
           <a:p>
             <a:pPr algn="r"/>
             <a:r>
-              <a:rPr lang="en-US" sz="1400" dirty="0">
+              <a:rPr lang="en-US" sz="1200" dirty="0">
                 <a:latin typeface="Arial" pitchFamily="34" charset="0"/>
                 <a:cs typeface="Arial" pitchFamily="34" charset="0"/>
               </a:rPr>
-              <a:t>February 16</a:t>
-            </a:r>
-            <a:r>
-              <a:rPr lang="de-DE" sz="1400" baseline="30000" dirty="0">
+              <a:t>March 30</a:t>
+            </a:r>
+            <a:r>
+              <a:rPr lang="de-DE" sz="1200" baseline="30000" dirty="0">
                 <a:latin typeface="Arial" pitchFamily="34" charset="0"/>
                 <a:cs typeface="Arial" pitchFamily="34" charset="0"/>
               </a:rPr>
               <a:t>th</a:t>
             </a:r>
             <a:r>
-              <a:rPr lang="de-DE" sz="1400" dirty="0">
+              <a:rPr lang="de-DE" sz="1200" dirty="0">
                 <a:latin typeface="Arial" pitchFamily="34" charset="0"/>
                 <a:cs typeface="Arial" pitchFamily="34" charset="0"/>
               </a:rPr>
@@ -5670,7 +5670,7 @@
           </a:ln>
           <a:extLst>
             <a:ext uri="{C572A759-6A51-4108-AA02-DFA0A04FC94B}">
-              <ma14:wrappingTextBoxFlag xmlns="" xmlns:m="http://schemas.openxmlformats.org/officeDocument/2006/math" xmlns:a14="http://schemas.microsoft.com/office/drawing/2010/main" xmlns:ma14="http://schemas.microsoft.com/office/mac/drawingml/2011/main" val="1"/>
+              <ma14:wrappingTextBoxFlag xmlns:ma14="http://schemas.microsoft.com/office/mac/drawingml/2011/main" xmlns:a14="http://schemas.microsoft.com/office/drawing/2010/main" xmlns:m="http://schemas.openxmlformats.org/officeDocument/2006/math" xmlns="" val="1"/>
             </a:ext>
           </a:extLst>
         </p:spPr>
@@ -5983,7 +5983,7 @@
           </a:ln>
           <a:extLst>
             <a:ext uri="{C572A759-6A51-4108-AA02-DFA0A04FC94B}">
-              <ma14:wrappingTextBoxFlag xmlns:ma14="http://schemas.microsoft.com/office/mac/drawingml/2011/main" xmlns:a14="http://schemas.microsoft.com/office/drawing/2010/main" xmlns:m="http://schemas.openxmlformats.org/officeDocument/2006/math" xmlns="" val="1"/>
+              <ma14:wrappingTextBoxFlag xmlns="" xmlns:m="http://schemas.openxmlformats.org/officeDocument/2006/math" xmlns:a14="http://schemas.microsoft.com/office/drawing/2010/main" xmlns:ma14="http://schemas.microsoft.com/office/mac/drawingml/2011/main" val="1"/>
             </a:ext>
           </a:extLst>
         </p:spPr>
@@ -6323,7 +6323,7 @@
           </a:ln>
           <a:extLst>
             <a:ext uri="{C572A759-6A51-4108-AA02-DFA0A04FC94B}">
-              <ma14:wrappingTextBoxFlag xmlns="" xmlns:m="http://schemas.openxmlformats.org/officeDocument/2006/math" xmlns:a14="http://schemas.microsoft.com/office/drawing/2010/main" xmlns:ma14="http://schemas.microsoft.com/office/mac/drawingml/2011/main" val="1"/>
+              <ma14:wrappingTextBoxFlag xmlns:ma14="http://schemas.microsoft.com/office/mac/drawingml/2011/main" xmlns:a14="http://schemas.microsoft.com/office/drawing/2010/main" xmlns:m="http://schemas.openxmlformats.org/officeDocument/2006/math" xmlns="" val="1"/>
             </a:ext>
           </a:extLst>
         </p:spPr>
@@ -6384,7 +6384,7 @@
           </a:ln>
           <a:extLst>
             <a:ext uri="{C572A759-6A51-4108-AA02-DFA0A04FC94B}">
-              <ma14:wrappingTextBoxFlag xmlns="" xmlns:m="http://schemas.openxmlformats.org/officeDocument/2006/math" xmlns:a14="http://schemas.microsoft.com/office/drawing/2010/main" xmlns:ma14="http://schemas.microsoft.com/office/mac/drawingml/2011/main" val="1"/>
+              <ma14:wrappingTextBoxFlag xmlns:ma14="http://schemas.microsoft.com/office/mac/drawingml/2011/main" xmlns:a14="http://schemas.microsoft.com/office/drawing/2010/main" xmlns:m="http://schemas.openxmlformats.org/officeDocument/2006/math" xmlns="" val="1"/>
             </a:ext>
           </a:extLst>
         </p:spPr>
@@ -6435,7 +6435,7 @@
           </a:ln>
           <a:extLst>
             <a:ext uri="{C572A759-6A51-4108-AA02-DFA0A04FC94B}">
-              <ma14:wrappingTextBoxFlag xmlns="" xmlns:m="http://schemas.openxmlformats.org/officeDocument/2006/math" xmlns:a14="http://schemas.microsoft.com/office/drawing/2010/main" xmlns:ma14="http://schemas.microsoft.com/office/mac/drawingml/2011/main" val="1"/>
+              <ma14:wrappingTextBoxFlag xmlns:ma14="http://schemas.microsoft.com/office/mac/drawingml/2011/main" xmlns:a14="http://schemas.microsoft.com/office/drawing/2010/main" xmlns:m="http://schemas.openxmlformats.org/officeDocument/2006/math" xmlns="" val="1"/>
             </a:ext>
           </a:extLst>
         </p:spPr>
@@ -7199,7 +7199,7 @@
           </a:ln>
           <a:extLst>
             <a:ext uri="{C572A759-6A51-4108-AA02-DFA0A04FC94B}">
-              <ma14:wrappingTextBoxFlag xmlns:ma14="http://schemas.microsoft.com/office/mac/drawingml/2011/main" xmlns:a14="http://schemas.microsoft.com/office/drawing/2010/main" xmlns:m="http://schemas.openxmlformats.org/officeDocument/2006/math" xmlns="" val="1"/>
+              <ma14:wrappingTextBoxFlag xmlns="" xmlns:m="http://schemas.openxmlformats.org/officeDocument/2006/math" xmlns:a14="http://schemas.microsoft.com/office/drawing/2010/main" xmlns:ma14="http://schemas.microsoft.com/office/mac/drawingml/2011/main" val="1"/>
             </a:ext>
           </a:extLst>
         </p:spPr>
@@ -7254,7 +7254,7 @@
           </a:ln>
           <a:extLst>
             <a:ext uri="{C572A759-6A51-4108-AA02-DFA0A04FC94B}">
-              <ma14:wrappingTextBoxFlag xmlns:ma14="http://schemas.microsoft.com/office/mac/drawingml/2011/main" xmlns:a14="http://schemas.microsoft.com/office/drawing/2010/main" xmlns:m="http://schemas.openxmlformats.org/officeDocument/2006/math" xmlns="" val="1"/>
+              <ma14:wrappingTextBoxFlag xmlns="" xmlns:m="http://schemas.openxmlformats.org/officeDocument/2006/math" xmlns:a14="http://schemas.microsoft.com/office/drawing/2010/main" xmlns:ma14="http://schemas.microsoft.com/office/mac/drawingml/2011/main" val="1"/>
             </a:ext>
           </a:extLst>
         </p:spPr>
@@ -7305,7 +7305,7 @@
           </a:ln>
           <a:extLst>
             <a:ext uri="{C572A759-6A51-4108-AA02-DFA0A04FC94B}">
-              <ma14:wrappingTextBoxFlag xmlns:ma14="http://schemas.microsoft.com/office/mac/drawingml/2011/main" xmlns:a14="http://schemas.microsoft.com/office/drawing/2010/main" xmlns:m="http://schemas.openxmlformats.org/officeDocument/2006/math" xmlns="" val="1"/>
+              <ma14:wrappingTextBoxFlag xmlns="" xmlns:m="http://schemas.openxmlformats.org/officeDocument/2006/math" xmlns:a14="http://schemas.microsoft.com/office/drawing/2010/main" xmlns:ma14="http://schemas.microsoft.com/office/mac/drawingml/2011/main" val="1"/>
             </a:ext>
           </a:extLst>
         </p:spPr>
@@ -7751,7 +7751,7 @@
           </a:ln>
           <a:extLst>
             <a:ext uri="{C572A759-6A51-4108-AA02-DFA0A04FC94B}">
-              <ma14:wrappingTextBoxFlag xmlns="" xmlns:m="http://schemas.openxmlformats.org/officeDocument/2006/math" xmlns:a14="http://schemas.microsoft.com/office/drawing/2010/main" xmlns:ma14="http://schemas.microsoft.com/office/mac/drawingml/2011/main" val="1"/>
+              <ma14:wrappingTextBoxFlag xmlns:ma14="http://schemas.microsoft.com/office/mac/drawingml/2011/main" xmlns:a14="http://schemas.microsoft.com/office/drawing/2010/main" xmlns:m="http://schemas.openxmlformats.org/officeDocument/2006/math" xmlns="" val="1"/>
             </a:ext>
           </a:extLst>
         </p:spPr>
@@ -8186,7 +8186,7 @@
           </a:ln>
           <a:extLst>
             <a:ext uri="{C572A759-6A51-4108-AA02-DFA0A04FC94B}">
-              <ma14:wrappingTextBoxFlag xmlns:ma14="http://schemas.microsoft.com/office/mac/drawingml/2011/main" xmlns:a14="http://schemas.microsoft.com/office/drawing/2010/main" xmlns:m="http://schemas.openxmlformats.org/officeDocument/2006/math" xmlns="" val="1"/>
+              <ma14:wrappingTextBoxFlag xmlns="" xmlns:m="http://schemas.openxmlformats.org/officeDocument/2006/math" xmlns:a14="http://schemas.microsoft.com/office/drawing/2010/main" xmlns:ma14="http://schemas.microsoft.com/office/mac/drawingml/2011/main" val="1"/>
             </a:ext>
           </a:extLst>
         </p:spPr>
@@ -8603,7 +8603,7 @@
           </a:ln>
           <a:extLst>
             <a:ext uri="{C572A759-6A51-4108-AA02-DFA0A04FC94B}">
-              <ma14:wrappingTextBoxFlag xmlns="" xmlns:m="http://schemas.openxmlformats.org/officeDocument/2006/math" xmlns:a14="http://schemas.microsoft.com/office/drawing/2010/main" xmlns:ma14="http://schemas.microsoft.com/office/mac/drawingml/2011/main" val="1"/>
+              <ma14:wrappingTextBoxFlag xmlns:ma14="http://schemas.microsoft.com/office/mac/drawingml/2011/main" xmlns:a14="http://schemas.microsoft.com/office/drawing/2010/main" xmlns:m="http://schemas.openxmlformats.org/officeDocument/2006/math" xmlns="" val="1"/>
             </a:ext>
           </a:extLst>
         </p:spPr>
@@ -8716,7 +8716,7 @@
                 <a:latin typeface="Calibri Light" panose="020F0302020204030204" pitchFamily="34" charset="0"/>
                 <a:cs typeface="Calibri Light" panose="020F0302020204030204" pitchFamily="34" charset="0"/>
               </a:rPr>
-              <a:t>-base-uncased’ was used as the base classifier model, it was then trained on about 3.5k annotated samples to classify goals from action statements. The Fine-tuning process adds 12 additional hidden layers on top of pre-trained BERT layers.</a:t>
+              <a:t>-base-uncased’ was used as the base classifier model, it was then trained on about 4.5k annotated samples to classify goals from action statements. The Fine-tuning process adds 12 additional hidden layers on top of pre-trained BERT layers.</a:t>
             </a:r>
           </a:p>
           <a:p>
@@ -9084,7 +9084,7 @@
           </a:ln>
           <a:extLst>
             <a:ext uri="{C572A759-6A51-4108-AA02-DFA0A04FC94B}">
-              <ma14:wrappingTextBoxFlag xmlns="" xmlns:m="http://schemas.openxmlformats.org/officeDocument/2006/math" xmlns:a14="http://schemas.microsoft.com/office/drawing/2010/main" xmlns:ma14="http://schemas.microsoft.com/office/mac/drawingml/2011/main" val="1"/>
+              <ma14:wrappingTextBoxFlag xmlns:ma14="http://schemas.microsoft.com/office/mac/drawingml/2011/main" xmlns:a14="http://schemas.microsoft.com/office/drawing/2010/main" xmlns:m="http://schemas.openxmlformats.org/officeDocument/2006/math" xmlns="" val="1"/>
             </a:ext>
           </a:extLst>
         </p:spPr>
@@ -9486,7 +9486,7 @@
           </a:ln>
           <a:extLst>
             <a:ext uri="{C572A759-6A51-4108-AA02-DFA0A04FC94B}">
-              <ma14:wrappingTextBoxFlag xmlns="" xmlns:m="http://schemas.openxmlformats.org/officeDocument/2006/math" xmlns:a14="http://schemas.microsoft.com/office/drawing/2010/main" xmlns:ma14="http://schemas.microsoft.com/office/mac/drawingml/2011/main" val="1"/>
+              <ma14:wrappingTextBoxFlag xmlns:ma14="http://schemas.microsoft.com/office/mac/drawingml/2011/main" xmlns:a14="http://schemas.microsoft.com/office/drawing/2010/main" xmlns:m="http://schemas.openxmlformats.org/officeDocument/2006/math" xmlns="" val="1"/>
             </a:ext>
           </a:extLst>
         </p:spPr>
@@ -9541,7 +9541,7 @@
           </a:ln>
           <a:extLst>
             <a:ext uri="{C572A759-6A51-4108-AA02-DFA0A04FC94B}">
-              <ma14:wrappingTextBoxFlag xmlns="" xmlns:m="http://schemas.openxmlformats.org/officeDocument/2006/math" xmlns:a14="http://schemas.microsoft.com/office/drawing/2010/main" xmlns:ma14="http://schemas.microsoft.com/office/mac/drawingml/2011/main" val="1"/>
+              <ma14:wrappingTextBoxFlag xmlns:ma14="http://schemas.microsoft.com/office/mac/drawingml/2011/main" xmlns:a14="http://schemas.microsoft.com/office/drawing/2010/main" xmlns:m="http://schemas.openxmlformats.org/officeDocument/2006/math" xmlns="" val="1"/>
             </a:ext>
           </a:extLst>
         </p:spPr>
@@ -9592,7 +9592,7 @@
           </a:ln>
           <a:extLst>
             <a:ext uri="{C572A759-6A51-4108-AA02-DFA0A04FC94B}">
-              <ma14:wrappingTextBoxFlag xmlns="" xmlns:m="http://schemas.openxmlformats.org/officeDocument/2006/math" xmlns:a14="http://schemas.microsoft.com/office/drawing/2010/main" xmlns:ma14="http://schemas.microsoft.com/office/mac/drawingml/2011/main" val="1"/>
+              <ma14:wrappingTextBoxFlag xmlns:ma14="http://schemas.microsoft.com/office/mac/drawingml/2011/main" xmlns:a14="http://schemas.microsoft.com/office/drawing/2010/main" xmlns:m="http://schemas.openxmlformats.org/officeDocument/2006/math" xmlns="" val="1"/>
             </a:ext>
           </a:extLst>
         </p:spPr>
@@ -9681,7 +9681,7 @@
           <p:nvPr>
             <p:extLst>
               <p:ext uri="{D42A27DB-BD31-4B8C-83A1-F6EECF244321}">
-                <p14:modId xmlns:p14="http://schemas.microsoft.com/office/powerpoint/2010/main" val="810957695"/>
+                <p14:modId xmlns:p14="http://schemas.microsoft.com/office/powerpoint/2010/main" val="43162016"/>
               </p:ext>
             </p:extLst>
           </p:nvPr>
@@ -9697,14 +9697,14 @@
                 <a:tableStyleId>{5940675A-B579-460E-94D1-54222C63F5DA}</a:tableStyleId>
               </a:tblPr>
               <a:tblGrid>
-                <a:gridCol w="419473">
+                <a:gridCol w="577555">
                   <a:extLst>
                     <a:ext uri="{9D8B030D-6E8A-4147-A177-3AD203B41FA5}">
                       <a16:colId xmlns:a16="http://schemas.microsoft.com/office/drawing/2014/main" val="3924503979"/>
                     </a:ext>
                   </a:extLst>
                 </a:gridCol>
-                <a:gridCol w="6040728">
+                <a:gridCol w="5882646">
                   <a:extLst>
                     <a:ext uri="{9D8B030D-6E8A-4147-A177-3AD203B41FA5}">
                       <a16:colId xmlns:a16="http://schemas.microsoft.com/office/drawing/2014/main" val="1629292043"/>
@@ -9726,7 +9726,7 @@
                     <a:lstStyle/>
                     <a:p>
                       <a:r>
-                        <a:rPr lang="en-US" sz="1600" b="0" i="0" dirty="0">
+                        <a:rPr lang="en-US" sz="1800" b="1" i="0" dirty="0">
                           <a:latin typeface="Calibri Light" panose="020F0302020204030204" pitchFamily="34" charset="0"/>
                           <a:cs typeface="Calibri Light" panose="020F0302020204030204" pitchFamily="34" charset="0"/>
                         </a:rPr>
@@ -9743,9 +9743,7 @@
                       <a:tailEnd type="none" w="med" len="med"/>
                     </a:lnL>
                     <a:lnR w="12700" cap="flat" cmpd="sng" algn="ctr">
-                      <a:solidFill>
-                        <a:schemeClr val="tx1"/>
-                      </a:solidFill>
+                      <a:noFill/>
                       <a:prstDash val="solid"/>
                       <a:round/>
                       <a:headEnd type="none" w="med" len="med"/>
@@ -9783,7 +9781,7 @@
                     <a:lstStyle/>
                     <a:p>
                       <a:r>
-                        <a:rPr lang="en-US" sz="1600" b="0" i="0" dirty="0">
+                        <a:rPr lang="en-US" sz="1800" b="1" i="0" dirty="0">
                           <a:latin typeface="Calibri Light" panose="020F0302020204030204" pitchFamily="34" charset="0"/>
                           <a:cs typeface="Calibri Light" panose="020F0302020204030204" pitchFamily="34" charset="0"/>
                         </a:rPr>
@@ -9793,18 +9791,14 @@
                   </a:txBody>
                   <a:tcPr>
                     <a:lnL w="12700" cap="flat" cmpd="sng" algn="ctr">
-                      <a:solidFill>
-                        <a:schemeClr val="tx1"/>
-                      </a:solidFill>
+                      <a:noFill/>
                       <a:prstDash val="solid"/>
                       <a:round/>
                       <a:headEnd type="none" w="med" len="med"/>
                       <a:tailEnd type="none" w="med" len="med"/>
                     </a:lnL>
                     <a:lnR w="12700" cap="flat" cmpd="sng" algn="ctr">
-                      <a:solidFill>
-                        <a:schemeClr val="tx1"/>
-                      </a:solidFill>
+                      <a:noFill/>
                       <a:prstDash val="solid"/>
                       <a:round/>
                       <a:headEnd type="none" w="med" len="med"/>
@@ -9842,7 +9836,7 @@
                     <a:lstStyle/>
                     <a:p>
                       <a:r>
-                        <a:rPr lang="en-US" sz="1600" b="0" i="0" dirty="0">
+                        <a:rPr lang="en-US" sz="1800" b="1" i="0" dirty="0">
                           <a:latin typeface="Calibri Light" panose="020F0302020204030204" pitchFamily="34" charset="0"/>
                           <a:cs typeface="Calibri Light" panose="020F0302020204030204" pitchFamily="34" charset="0"/>
                         </a:rPr>
@@ -9852,9 +9846,7 @@
                   </a:txBody>
                   <a:tcPr>
                     <a:lnL w="12700" cap="flat" cmpd="sng" algn="ctr">
-                      <a:solidFill>
-                        <a:schemeClr val="tx1"/>
-                      </a:solidFill>
+                      <a:noFill/>
                       <a:prstDash val="solid"/>
                       <a:round/>
                       <a:headEnd type="none" w="med" len="med"/>
@@ -9906,7 +9898,7 @@
                     <a:lstStyle/>
                     <a:p>
                       <a:r>
-                        <a:rPr lang="en-US" sz="1600" b="0" i="0" dirty="0">
+                        <a:rPr lang="en-US" sz="1400" b="0" i="0" dirty="0">
                           <a:latin typeface="Calibri Light" panose="020F0302020204030204" pitchFamily="34" charset="0"/>
                           <a:cs typeface="Calibri Light" panose="020F0302020204030204" pitchFamily="34" charset="0"/>
                         </a:rPr>
@@ -9923,9 +9915,7 @@
                       <a:tailEnd type="none" w="med" len="med"/>
                     </a:lnL>
                     <a:lnR w="12700" cap="flat" cmpd="sng" algn="ctr">
-                      <a:solidFill>
-                        <a:schemeClr val="tx1"/>
-                      </a:solidFill>
+                      <a:noFill/>
                       <a:prstDash val="solid"/>
                       <a:round/>
                       <a:headEnd type="none" w="med" len="med"/>
@@ -9965,28 +9955,28 @@
                     <a:lstStyle/>
                     <a:p>
                       <a:r>
-                        <a:rPr lang="en-US" sz="1600" b="0" i="0" dirty="0" err="1">
+                        <a:rPr lang="en-US" sz="1400" b="0" i="0" dirty="0" err="1">
                           <a:latin typeface="Calibri Light" panose="020F0302020204030204" pitchFamily="34" charset="0"/>
                           <a:cs typeface="Calibri Light" panose="020F0302020204030204" pitchFamily="34" charset="0"/>
                         </a:rPr>
                         <a:t>Github</a:t>
                       </a:r>
                       <a:r>
-                        <a:rPr lang="en-US" sz="1600" b="0" i="0" dirty="0">
+                        <a:rPr lang="en-US" sz="1400" b="0" i="0" dirty="0">
                           <a:latin typeface="Calibri Light" panose="020F0302020204030204" pitchFamily="34" charset="0"/>
                           <a:cs typeface="Calibri Light" panose="020F0302020204030204" pitchFamily="34" charset="0"/>
                         </a:rPr>
                         <a:t> repository of </a:t>
                       </a:r>
                       <a:r>
-                        <a:rPr lang="en-US" sz="1600" b="0" i="0" dirty="0" err="1">
+                        <a:rPr lang="en-US" sz="1400" b="0" i="0" dirty="0" err="1">
                           <a:latin typeface="Calibri Light" panose="020F0302020204030204" pitchFamily="34" charset="0"/>
                           <a:cs typeface="Calibri Light" panose="020F0302020204030204" pitchFamily="34" charset="0"/>
                         </a:rPr>
                         <a:t>explosion.ai</a:t>
                       </a:r>
                       <a:r>
-                        <a:rPr lang="en-US" sz="1600" b="0" i="0" dirty="0">
+                        <a:rPr lang="en-US" sz="1400" b="0" i="0" dirty="0">
                           <a:latin typeface="Calibri Light" panose="020F0302020204030204" pitchFamily="34" charset="0"/>
                           <a:cs typeface="Calibri Light" panose="020F0302020204030204" pitchFamily="34" charset="0"/>
                         </a:rPr>
@@ -9996,18 +9986,14 @@
                   </a:txBody>
                   <a:tcPr>
                     <a:lnL w="12700" cap="flat" cmpd="sng" algn="ctr">
-                      <a:solidFill>
-                        <a:schemeClr val="tx1"/>
-                      </a:solidFill>
+                      <a:noFill/>
                       <a:prstDash val="solid"/>
                       <a:round/>
                       <a:headEnd type="none" w="med" len="med"/>
                       <a:tailEnd type="none" w="med" len="med"/>
                     </a:lnL>
                     <a:lnR w="12700" cap="flat" cmpd="sng" algn="ctr">
-                      <a:solidFill>
-                        <a:schemeClr val="tx1"/>
-                      </a:solidFill>
+                      <a:noFill/>
                       <a:prstDash val="solid"/>
                       <a:round/>
                       <a:headEnd type="none" w="med" len="med"/>
@@ -10047,14 +10033,14 @@
                     <a:lstStyle/>
                     <a:p>
                       <a:r>
-                        <a:rPr lang="en-US" sz="1600" b="0" i="0" dirty="0">
+                        <a:rPr lang="en-US" sz="1400" b="0" i="0" dirty="0">
                           <a:latin typeface="Calibri Light" panose="020F0302020204030204" pitchFamily="34" charset="0"/>
                           <a:cs typeface="Calibri Light" panose="020F0302020204030204" pitchFamily="34" charset="0"/>
                           <a:hlinkClick r:id="rId2"/>
                         </a:rPr>
                         <a:t>link</a:t>
                       </a:r>
-                      <a:endParaRPr lang="en-US" sz="1600" b="0" i="0" dirty="0">
+                      <a:endParaRPr lang="en-US" sz="1400" b="0" i="0" dirty="0">
                         <a:latin typeface="Calibri Light" panose="020F0302020204030204" pitchFamily="34" charset="0"/>
                         <a:cs typeface="Calibri Light" panose="020F0302020204030204" pitchFamily="34" charset="0"/>
                       </a:endParaRPr>
@@ -10062,9 +10048,7 @@
                   </a:txBody>
                   <a:tcPr>
                     <a:lnL w="12700" cap="flat" cmpd="sng" algn="ctr">
-                      <a:solidFill>
-                        <a:schemeClr val="tx1"/>
-                      </a:solidFill>
+                      <a:noFill/>
                       <a:prstDash val="solid"/>
                       <a:round/>
                       <a:headEnd type="none" w="med" len="med"/>
@@ -10118,7 +10102,7 @@
                     <a:lstStyle/>
                     <a:p>
                       <a:r>
-                        <a:rPr lang="en-US" sz="1600" b="0" i="0" dirty="0">
+                        <a:rPr lang="en-US" sz="1400" b="0" i="0" dirty="0">
                           <a:latin typeface="Calibri Light" panose="020F0302020204030204" pitchFamily="34" charset="0"/>
                           <a:cs typeface="Calibri Light" panose="020F0302020204030204" pitchFamily="34" charset="0"/>
                         </a:rPr>
@@ -10135,9 +10119,7 @@
                       <a:tailEnd type="none" w="med" len="med"/>
                     </a:lnL>
                     <a:lnR w="12700" cap="flat" cmpd="sng" algn="ctr">
-                      <a:solidFill>
-                        <a:schemeClr val="tx1"/>
-                      </a:solidFill>
+                      <a:noFill/>
                       <a:prstDash val="solid"/>
                       <a:round/>
                       <a:headEnd type="none" w="med" len="med"/>
@@ -10194,7 +10176,7 @@
                         <a:defRPr/>
                       </a:pPr>
                       <a:r>
-                        <a:rPr lang="en-US" sz="1600" b="0" i="0" dirty="0">
+                        <a:rPr lang="en-US" sz="1400" b="0" i="0" dirty="0">
                           <a:latin typeface="Calibri Light" panose="020F0302020204030204" pitchFamily="34" charset="0"/>
                           <a:cs typeface="Calibri Light" panose="020F0302020204030204" pitchFamily="34" charset="0"/>
                         </a:rPr>
@@ -10204,18 +10186,14 @@
                   </a:txBody>
                   <a:tcPr>
                     <a:lnL w="12700" cap="flat" cmpd="sng" algn="ctr">
-                      <a:solidFill>
-                        <a:schemeClr val="tx1"/>
-                      </a:solidFill>
+                      <a:noFill/>
                       <a:prstDash val="solid"/>
                       <a:round/>
                       <a:headEnd type="none" w="med" len="med"/>
                       <a:tailEnd type="none" w="med" len="med"/>
                     </a:lnL>
                     <a:lnR w="12700" cap="flat" cmpd="sng" algn="ctr">
-                      <a:solidFill>
-                        <a:schemeClr val="tx1"/>
-                      </a:solidFill>
+                      <a:noFill/>
                       <a:prstDash val="solid"/>
                       <a:round/>
                       <a:headEnd type="none" w="med" len="med"/>
@@ -10272,14 +10250,14 @@
                         <a:defRPr/>
                       </a:pPr>
                       <a:r>
-                        <a:rPr lang="en-US" sz="1600" b="0" i="0" dirty="0">
+                        <a:rPr lang="en-US" sz="1400" b="0" i="0" dirty="0">
                           <a:latin typeface="Calibri Light" panose="020F0302020204030204" pitchFamily="34" charset="0"/>
                           <a:cs typeface="Calibri Light" panose="020F0302020204030204" pitchFamily="34" charset="0"/>
                           <a:hlinkClick r:id="rId3"/>
                         </a:rPr>
                         <a:t>link</a:t>
                       </a:r>
-                      <a:endParaRPr lang="en-US" sz="1600" b="0" i="0" dirty="0">
+                      <a:endParaRPr lang="en-US" sz="1400" b="0" i="0" dirty="0">
                         <a:latin typeface="Calibri Light" panose="020F0302020204030204" pitchFamily="34" charset="0"/>
                         <a:cs typeface="Calibri Light" panose="020F0302020204030204" pitchFamily="34" charset="0"/>
                       </a:endParaRPr>
@@ -10287,9 +10265,7 @@
                   </a:txBody>
                   <a:tcPr>
                     <a:lnL w="12700" cap="flat" cmpd="sng" algn="ctr">
-                      <a:solidFill>
-                        <a:schemeClr val="tx1"/>
-                      </a:solidFill>
+                      <a:noFill/>
                       <a:prstDash val="solid"/>
                       <a:round/>
                       <a:headEnd type="none" w="med" len="med"/>
@@ -10343,7 +10319,7 @@
                     <a:lstStyle/>
                     <a:p>
                       <a:r>
-                        <a:rPr lang="en-US" sz="1600" b="0" i="0" dirty="0">
+                        <a:rPr lang="en-US" sz="1400" b="0" i="0" dirty="0">
                           <a:latin typeface="Calibri Light" panose="020F0302020204030204" pitchFamily="34" charset="0"/>
                           <a:cs typeface="Calibri Light" panose="020F0302020204030204" pitchFamily="34" charset="0"/>
                         </a:rPr>
@@ -10360,9 +10336,7 @@
                       <a:tailEnd type="none" w="med" len="med"/>
                     </a:lnL>
                     <a:lnR w="12700" cap="flat" cmpd="sng" algn="ctr">
-                      <a:solidFill>
-                        <a:schemeClr val="tx1"/>
-                      </a:solidFill>
+                      <a:noFill/>
                       <a:prstDash val="solid"/>
                       <a:round/>
                       <a:headEnd type="none" w="med" len="med"/>
@@ -10402,7 +10376,7 @@
                     <a:lstStyle/>
                     <a:p>
                       <a:r>
-                        <a:rPr lang="en-US" sz="1600" b="0" i="0" dirty="0">
+                        <a:rPr lang="en-US" sz="1400" b="0" i="0" dirty="0">
                           <a:latin typeface="Calibri Light" panose="020F0302020204030204" pitchFamily="34" charset="0"/>
                           <a:cs typeface="Calibri Light" panose="020F0302020204030204" pitchFamily="34" charset="0"/>
                         </a:rPr>
@@ -10412,18 +10386,14 @@
                   </a:txBody>
                   <a:tcPr>
                     <a:lnL w="12700" cap="flat" cmpd="sng" algn="ctr">
-                      <a:solidFill>
-                        <a:schemeClr val="tx1"/>
-                      </a:solidFill>
+                      <a:noFill/>
                       <a:prstDash val="solid"/>
                       <a:round/>
                       <a:headEnd type="none" w="med" len="med"/>
                       <a:tailEnd type="none" w="med" len="med"/>
                     </a:lnL>
                     <a:lnR w="12700" cap="flat" cmpd="sng" algn="ctr">
-                      <a:solidFill>
-                        <a:schemeClr val="tx1"/>
-                      </a:solidFill>
+                      <a:noFill/>
                       <a:prstDash val="solid"/>
                       <a:round/>
                       <a:headEnd type="none" w="med" len="med"/>
@@ -10463,14 +10433,14 @@
                     <a:lstStyle/>
                     <a:p>
                       <a:r>
-                        <a:rPr lang="en-US" sz="1600" b="0" i="0" dirty="0">
+                        <a:rPr lang="en-US" sz="1400" b="0" i="0" dirty="0">
                           <a:latin typeface="Calibri Light" panose="020F0302020204030204" pitchFamily="34" charset="0"/>
                           <a:cs typeface="Calibri Light" panose="020F0302020204030204" pitchFamily="34" charset="0"/>
                           <a:hlinkClick r:id="rId4"/>
                         </a:rPr>
                         <a:t>link</a:t>
                       </a:r>
-                      <a:endParaRPr lang="en-US" sz="1600" b="0" i="0" dirty="0">
+                      <a:endParaRPr lang="en-US" sz="1400" b="0" i="0" dirty="0">
                         <a:latin typeface="Calibri Light" panose="020F0302020204030204" pitchFamily="34" charset="0"/>
                         <a:cs typeface="Calibri Light" panose="020F0302020204030204" pitchFamily="34" charset="0"/>
                       </a:endParaRPr>
@@ -10478,9 +10448,7 @@
                   </a:txBody>
                   <a:tcPr>
                     <a:lnL w="12700" cap="flat" cmpd="sng" algn="ctr">
-                      <a:solidFill>
-                        <a:schemeClr val="tx1"/>
-                      </a:solidFill>
+                      <a:noFill/>
                       <a:prstDash val="solid"/>
                       <a:round/>
                       <a:headEnd type="none" w="med" len="med"/>
@@ -10534,7 +10502,7 @@
                     <a:lstStyle/>
                     <a:p>
                       <a:r>
-                        <a:rPr lang="en-US" sz="1600" b="0" i="0" dirty="0">
+                        <a:rPr lang="en-US" sz="1400" b="0" i="0" dirty="0">
                           <a:latin typeface="Calibri Light" panose="020F0302020204030204" pitchFamily="34" charset="0"/>
                           <a:cs typeface="Calibri Light" panose="020F0302020204030204" pitchFamily="34" charset="0"/>
                         </a:rPr>
@@ -10551,9 +10519,7 @@
                       <a:tailEnd type="none" w="med" len="med"/>
                     </a:lnL>
                     <a:lnR w="12700" cap="flat" cmpd="sng" algn="ctr">
-                      <a:solidFill>
-                        <a:schemeClr val="tx1"/>
-                      </a:solidFill>
+                      <a:noFill/>
                       <a:prstDash val="solid"/>
                       <a:round/>
                       <a:headEnd type="none" w="med" len="med"/>
@@ -10593,21 +10559,21 @@
                     <a:lstStyle/>
                     <a:p>
                       <a:r>
-                        <a:rPr lang="en-US" sz="1600" b="0" i="0" dirty="0">
+                        <a:rPr lang="en-US" sz="1400" b="0" i="0" dirty="0">
                           <a:latin typeface="Calibri Light" panose="020F0302020204030204" pitchFamily="34" charset="0"/>
                           <a:cs typeface="Calibri Light" panose="020F0302020204030204" pitchFamily="34" charset="0"/>
                         </a:rPr>
                         <a:t>About explosion(author of neural </a:t>
                       </a:r>
                       <a:r>
-                        <a:rPr lang="en-US" sz="1600" b="0" i="0" dirty="0" err="1">
+                        <a:rPr lang="en-US" sz="1400" b="0" i="0" dirty="0" err="1">
                           <a:latin typeface="Calibri Light" panose="020F0302020204030204" pitchFamily="34" charset="0"/>
                           <a:cs typeface="Calibri Light" panose="020F0302020204030204" pitchFamily="34" charset="0"/>
                         </a:rPr>
                         <a:t>coref</a:t>
                       </a:r>
                       <a:r>
-                        <a:rPr lang="en-US" sz="1600" b="0" i="0" dirty="0">
+                        <a:rPr lang="en-US" sz="1400" b="0" i="0" dirty="0">
                           <a:latin typeface="Calibri Light" panose="020F0302020204030204" pitchFamily="34" charset="0"/>
                           <a:cs typeface="Calibri Light" panose="020F0302020204030204" pitchFamily="34" charset="0"/>
                         </a:rPr>
@@ -10617,18 +10583,14 @@
                   </a:txBody>
                   <a:tcPr>
                     <a:lnL w="12700" cap="flat" cmpd="sng" algn="ctr">
-                      <a:solidFill>
-                        <a:schemeClr val="tx1"/>
-                      </a:solidFill>
+                      <a:noFill/>
                       <a:prstDash val="solid"/>
                       <a:round/>
                       <a:headEnd type="none" w="med" len="med"/>
                       <a:tailEnd type="none" w="med" len="med"/>
                     </a:lnL>
                     <a:lnR w="12700" cap="flat" cmpd="sng" algn="ctr">
-                      <a:solidFill>
-                        <a:schemeClr val="tx1"/>
-                      </a:solidFill>
+                      <a:noFill/>
                       <a:prstDash val="solid"/>
                       <a:round/>
                       <a:headEnd type="none" w="med" len="med"/>
@@ -10668,14 +10630,14 @@
                     <a:lstStyle/>
                     <a:p>
                       <a:r>
-                        <a:rPr lang="en-US" sz="1600" b="0" i="0" dirty="0">
+                        <a:rPr lang="en-US" sz="1400" b="0" i="0" dirty="0">
                           <a:latin typeface="Calibri Light" panose="020F0302020204030204" pitchFamily="34" charset="0"/>
                           <a:cs typeface="Calibri Light" panose="020F0302020204030204" pitchFamily="34" charset="0"/>
                           <a:hlinkClick r:id="rId5"/>
                         </a:rPr>
                         <a:t>link</a:t>
                       </a:r>
-                      <a:endParaRPr lang="en-US" sz="1600" b="0" i="0" dirty="0">
+                      <a:endParaRPr lang="en-US" sz="1400" b="0" i="0" dirty="0">
                         <a:latin typeface="Calibri Light" panose="020F0302020204030204" pitchFamily="34" charset="0"/>
                         <a:cs typeface="Calibri Light" panose="020F0302020204030204" pitchFamily="34" charset="0"/>
                       </a:endParaRPr>
@@ -10683,9 +10645,7 @@
                   </a:txBody>
                   <a:tcPr>
                     <a:lnL w="12700" cap="flat" cmpd="sng" algn="ctr">
-                      <a:solidFill>
-                        <a:schemeClr val="tx1"/>
-                      </a:solidFill>
+                      <a:noFill/>
                       <a:prstDash val="solid"/>
                       <a:round/>
                       <a:headEnd type="none" w="med" len="med"/>
@@ -10739,7 +10699,7 @@
                     <a:lstStyle/>
                     <a:p>
                       <a:r>
-                        <a:rPr lang="en-US" sz="1600" b="0" i="0" dirty="0">
+                        <a:rPr lang="en-US" sz="1400" b="0" i="0" dirty="0">
                           <a:latin typeface="Calibri Light" panose="020F0302020204030204" pitchFamily="34" charset="0"/>
                           <a:cs typeface="Calibri Light" panose="020F0302020204030204" pitchFamily="34" charset="0"/>
                         </a:rPr>
@@ -10756,9 +10716,7 @@
                       <a:tailEnd type="none" w="med" len="med"/>
                     </a:lnL>
                     <a:lnR w="12700" cap="flat" cmpd="sng" algn="ctr">
-                      <a:solidFill>
-                        <a:schemeClr val="tx1"/>
-                      </a:solidFill>
+                      <a:noFill/>
                       <a:prstDash val="solid"/>
                       <a:round/>
                       <a:headEnd type="none" w="med" len="med"/>
@@ -10798,7 +10756,7 @@
                     <a:lstStyle/>
                     <a:p>
                       <a:r>
-                        <a:rPr lang="en-US" sz="1600" b="0" i="0" dirty="0">
+                        <a:rPr lang="en-US" sz="1400" b="0" i="0" dirty="0">
                           <a:latin typeface="Calibri Light" panose="020F0302020204030204" pitchFamily="34" charset="0"/>
                           <a:cs typeface="Calibri Light" panose="020F0302020204030204" pitchFamily="34" charset="0"/>
                         </a:rPr>
@@ -10808,18 +10766,14 @@
                   </a:txBody>
                   <a:tcPr>
                     <a:lnL w="12700" cap="flat" cmpd="sng" algn="ctr">
-                      <a:solidFill>
-                        <a:schemeClr val="tx1"/>
-                      </a:solidFill>
+                      <a:noFill/>
                       <a:prstDash val="solid"/>
                       <a:round/>
                       <a:headEnd type="none" w="med" len="med"/>
                       <a:tailEnd type="none" w="med" len="med"/>
                     </a:lnL>
                     <a:lnR w="12700" cap="flat" cmpd="sng" algn="ctr">
-                      <a:solidFill>
-                        <a:schemeClr val="tx1"/>
-                      </a:solidFill>
+                      <a:noFill/>
                       <a:prstDash val="solid"/>
                       <a:round/>
                       <a:headEnd type="none" w="med" len="med"/>
@@ -10859,14 +10813,14 @@
                     <a:lstStyle/>
                     <a:p>
                       <a:r>
-                        <a:rPr lang="en-US" sz="1600" b="0" i="0" dirty="0">
+                        <a:rPr lang="en-US" sz="1400" b="0" i="0" dirty="0">
                           <a:latin typeface="Calibri Light" panose="020F0302020204030204" pitchFamily="34" charset="0"/>
                           <a:cs typeface="Calibri Light" panose="020F0302020204030204" pitchFamily="34" charset="0"/>
                           <a:hlinkClick r:id="rId6"/>
                         </a:rPr>
                         <a:t>link</a:t>
                       </a:r>
-                      <a:endParaRPr lang="en-US" sz="1600" b="0" i="0" dirty="0">
+                      <a:endParaRPr lang="en-US" sz="1400" b="0" i="0" dirty="0">
                         <a:latin typeface="Calibri Light" panose="020F0302020204030204" pitchFamily="34" charset="0"/>
                         <a:cs typeface="Calibri Light" panose="020F0302020204030204" pitchFamily="34" charset="0"/>
                       </a:endParaRPr>
@@ -10874,9 +10828,7 @@
                   </a:txBody>
                   <a:tcPr>
                     <a:lnL w="12700" cap="flat" cmpd="sng" algn="ctr">
-                      <a:solidFill>
-                        <a:schemeClr val="tx1"/>
-                      </a:solidFill>
+                      <a:noFill/>
                       <a:prstDash val="solid"/>
                       <a:round/>
                       <a:headEnd type="none" w="med" len="med"/>
@@ -10944,9 +10896,7 @@
                       <a:tailEnd type="none" w="med" len="med"/>
                     </a:lnL>
                     <a:lnR w="12700" cap="flat" cmpd="sng" algn="ctr">
-                      <a:solidFill>
-                        <a:schemeClr val="tx1"/>
-                      </a:solidFill>
+                      <a:noFill/>
                       <a:prstDash val="solid"/>
                       <a:round/>
                       <a:headEnd type="none" w="med" len="med"/>
@@ -10991,18 +10941,14 @@
                   </a:txBody>
                   <a:tcPr>
                     <a:lnL w="12700" cap="flat" cmpd="sng" algn="ctr">
-                      <a:solidFill>
-                        <a:schemeClr val="tx1"/>
-                      </a:solidFill>
+                      <a:noFill/>
                       <a:prstDash val="solid"/>
                       <a:round/>
                       <a:headEnd type="none" w="med" len="med"/>
                       <a:tailEnd type="none" w="med" len="med"/>
                     </a:lnL>
                     <a:lnR w="12700" cap="flat" cmpd="sng" algn="ctr">
-                      <a:solidFill>
-                        <a:schemeClr val="tx1"/>
-                      </a:solidFill>
+                      <a:noFill/>
                       <a:prstDash val="solid"/>
                       <a:round/>
                       <a:headEnd type="none" w="med" len="med"/>
@@ -11047,9 +10993,7 @@
                   </a:txBody>
                   <a:tcPr>
                     <a:lnL w="12700" cap="flat" cmpd="sng" algn="ctr">
-                      <a:solidFill>
-                        <a:schemeClr val="tx1"/>
-                      </a:solidFill>
+                      <a:noFill/>
                       <a:prstDash val="solid"/>
                       <a:round/>
                       <a:headEnd type="none" w="med" len="med"/>

</xml_diff>